<commit_message>
Add question create UI
</commit_message>
<xml_diff>
--- a/lectures/lecture05.pptx
+++ b/lectures/lecture05.pptx
@@ -7,10 +7,11 @@
   <p:sldIdLst>
     <p:sldId id="256" r:id="rId2"/>
     <p:sldId id="258" r:id="rId3"/>
-    <p:sldId id="259" r:id="rId4"/>
-    <p:sldId id="260" r:id="rId5"/>
-    <p:sldId id="261" r:id="rId6"/>
-    <p:sldId id="262" r:id="rId7"/>
+    <p:sldId id="263" r:id="rId4"/>
+    <p:sldId id="259" r:id="rId5"/>
+    <p:sldId id="260" r:id="rId6"/>
+    <p:sldId id="261" r:id="rId7"/>
+    <p:sldId id="262" r:id="rId8"/>
   </p:sldIdLst>
   <p:sldSz cx="12192000" cy="6858000"/>
   <p:notesSz cx="6858000" cy="9144000"/>
@@ -4948,7 +4949,7 @@
         <p:spPr>
           <a:xfrm>
             <a:off x="345731" y="2595914"/>
-            <a:ext cx="1776032" cy="830997"/>
+            <a:ext cx="1776032" cy="1200329"/>
           </a:xfrm>
           <a:prstGeom prst="rect">
             <a:avLst/>
@@ -4979,26 +4980,57 @@
               <a:defRPr/>
             </a:pPr>
             <a:r>
-              <a:rPr lang="en-US" altLang="zh-CN" sz="2400" dirty="0">
+              <a:rPr kumimoji="0" lang="zh-CN" altLang="en-US" sz="2400" b="0" i="0" u="none" strike="noStrike" kern="1200" cap="none" spc="0" normalizeH="0" baseline="0" noProof="0" dirty="0">
+                <a:ln>
+                  <a:noFill/>
+                </a:ln>
                 <a:solidFill>
                   <a:prstClr val="white"/>
                 </a:solidFill>
+                <a:effectLst/>
+                <a:uLnTx/>
+                <a:uFillTx/>
                 <a:latin typeface="Calibri" panose="020F0502020204030204"/>
                 <a:ea typeface="等线" panose="02010600030101010101" pitchFamily="2" charset="-122"/>
-              </a:rPr>
-              <a:t>Create A </a:t>
-            </a:r>
-            <a:r>
-              <a:rPr lang="en-US" sz="2400" dirty="0">
+                <a:cs typeface="+mn-cs"/>
+              </a:rPr>
+              <a:t>检查</a:t>
+            </a:r>
+            <a:r>
+              <a:rPr kumimoji="0" lang="en-US" altLang="zh-CN" sz="2400" b="0" i="0" u="none" strike="noStrike" kern="1200" cap="none" spc="0" normalizeH="0" baseline="0" noProof="0" dirty="0">
+                <a:ln>
+                  <a:noFill/>
+                </a:ln>
                 <a:solidFill>
                   <a:prstClr val="white"/>
                 </a:solidFill>
+                <a:effectLst/>
+                <a:uLnTx/>
+                <a:uFillTx/>
                 <a:latin typeface="Calibri" panose="020F0502020204030204"/>
                 <a:ea typeface="等线" panose="02010600030101010101" pitchFamily="2" charset="-122"/>
-              </a:rPr>
-              <a:t>Model</a:t>
-            </a:r>
-            <a:endParaRPr kumimoji="0" lang="en-US" sz="2400" b="0" i="0" u="none" strike="noStrike" kern="1200" cap="none" spc="0" normalizeH="0" baseline="0" noProof="0" dirty="0">
+                <a:cs typeface="+mn-cs"/>
+              </a:rPr>
+              <a:t>rematch</a:t>
+            </a:r>
+            <a:r>
+              <a:rPr kumimoji="0" lang="zh-CN" altLang="en-US" sz="2400" b="0" i="0" u="none" strike="noStrike" kern="1200" cap="none" spc="0" normalizeH="0" baseline="0" noProof="0" dirty="0">
+                <a:ln>
+                  <a:noFill/>
+                </a:ln>
+                <a:solidFill>
+                  <a:prstClr val="white"/>
+                </a:solidFill>
+                <a:effectLst/>
+                <a:uLnTx/>
+                <a:uFillTx/>
+                <a:latin typeface="Calibri" panose="020F0502020204030204"/>
+                <a:ea typeface="等线" panose="02010600030101010101" pitchFamily="2" charset="-122"/>
+                <a:cs typeface="+mn-cs"/>
+              </a:rPr>
+              <a:t>初始化</a:t>
+            </a:r>
+            <a:endParaRPr kumimoji="0" lang="en-US" altLang="zh-CN" sz="2400" b="0" i="0" u="none" strike="noStrike" kern="1200" cap="none" spc="0" normalizeH="0" baseline="0" noProof="0" dirty="0">
               <a:ln>
                 <a:noFill/>
               </a:ln>
@@ -5009,7 +5041,7 @@
               <a:uLnTx/>
               <a:uFillTx/>
               <a:latin typeface="Calibri" panose="020F0502020204030204"/>
-              <a:ea typeface="+mn-ea"/>
+              <a:ea typeface="等线" panose="02010600030101010101" pitchFamily="2" charset="-122"/>
               <a:cs typeface="+mn-cs"/>
             </a:endParaRPr>
           </a:p>
@@ -5056,7 +5088,7 @@
           <p:cNvPr id="2" name="矩形 1">
             <a:extLst>
               <a:ext uri="{FF2B5EF4-FFF2-40B4-BE49-F238E27FC236}">
-                <a16:creationId xmlns:a16="http://schemas.microsoft.com/office/drawing/2014/main" id="{BCA2521E-563E-47D0-9AC2-2C559DCC2E08}"/>
+                <a16:creationId xmlns:a16="http://schemas.microsoft.com/office/drawing/2014/main" id="{9D4438D2-456A-4129-A7B2-E42280525A67}"/>
               </a:ext>
             </a:extLst>
           </p:cNvPr>
@@ -5065,15 +5097,15 @@
         </p:nvSpPr>
         <p:spPr>
           <a:xfrm>
-            <a:off x="2787090" y="2349693"/>
-            <a:ext cx="6096000" cy="1107996"/>
+            <a:off x="2787090" y="1710534"/>
+            <a:ext cx="8706035" cy="3293209"/>
           </a:xfrm>
           <a:prstGeom prst="rect">
             <a:avLst/>
           </a:prstGeom>
         </p:spPr>
         <p:txBody>
-          <a:bodyPr>
+          <a:bodyPr wrap="square">
             <a:spAutoFit/>
           </a:bodyPr>
           <a:lstStyle/>
@@ -5081,18 +5113,281 @@
             <a:r>
               <a:rPr lang="en-US" sz="1600" dirty="0">
                 <a:solidFill>
-                  <a:schemeClr val="accent6">
-                    <a:lumMod val="75000"/>
-                  </a:schemeClr>
-                </a:solidFill>
-              </a:rPr>
-              <a:t>// In file /models.js</a:t>
+                  <a:srgbClr val="C586C0"/>
+                </a:solidFill>
+                <a:latin typeface="Consolas" panose="020B0609020204030204" pitchFamily="49" charset="0"/>
+              </a:rPr>
+              <a:t>import</a:t>
+            </a:r>
+            <a:r>
+              <a:rPr lang="en-US" sz="1600" dirty="0">
+                <a:solidFill>
+                  <a:srgbClr val="D4D4D4"/>
+                </a:solidFill>
+                <a:latin typeface="Consolas" panose="020B0609020204030204" pitchFamily="49" charset="0"/>
+              </a:rPr>
+              <a:t> { </a:t>
+            </a:r>
+            <a:r>
+              <a:rPr lang="en-US" sz="1600" dirty="0" err="1">
+                <a:solidFill>
+                  <a:srgbClr val="9CDCFE"/>
+                </a:solidFill>
+                <a:latin typeface="Consolas" panose="020B0609020204030204" pitchFamily="49" charset="0"/>
+              </a:rPr>
+              <a:t>init</a:t>
+            </a:r>
+            <a:r>
+              <a:rPr lang="en-US" sz="1600" dirty="0">
+                <a:solidFill>
+                  <a:srgbClr val="D4D4D4"/>
+                </a:solidFill>
+                <a:latin typeface="Consolas" panose="020B0609020204030204" pitchFamily="49" charset="0"/>
+              </a:rPr>
+              <a:t> } </a:t>
+            </a:r>
+            <a:r>
+              <a:rPr lang="en-US" sz="1600" dirty="0">
+                <a:solidFill>
+                  <a:srgbClr val="C586C0"/>
+                </a:solidFill>
+                <a:latin typeface="Consolas" panose="020B0609020204030204" pitchFamily="49" charset="0"/>
+              </a:rPr>
+              <a:t>from</a:t>
+            </a:r>
+            <a:r>
+              <a:rPr lang="en-US" sz="1600" dirty="0">
+                <a:solidFill>
+                  <a:srgbClr val="D4D4D4"/>
+                </a:solidFill>
+                <a:latin typeface="Consolas" panose="020B0609020204030204" pitchFamily="49" charset="0"/>
+              </a:rPr>
+              <a:t> </a:t>
+            </a:r>
+            <a:r>
+              <a:rPr lang="en-US" sz="1600" dirty="0">
+                <a:solidFill>
+                  <a:srgbClr val="CE9178"/>
+                </a:solidFill>
+                <a:latin typeface="Consolas" panose="020B0609020204030204" pitchFamily="49" charset="0"/>
+              </a:rPr>
+              <a:t>"@rematch/core"</a:t>
+            </a:r>
+            <a:r>
+              <a:rPr lang="en-US" sz="1600" dirty="0">
+                <a:solidFill>
+                  <a:srgbClr val="D4D4D4"/>
+                </a:solidFill>
+                <a:latin typeface="Consolas" panose="020B0609020204030204" pitchFamily="49" charset="0"/>
+              </a:rPr>
+              <a:t>;</a:t>
+            </a:r>
+          </a:p>
+          <a:p>
+            <a:r>
+              <a:rPr lang="en-US" sz="1600" dirty="0">
+                <a:solidFill>
+                  <a:srgbClr val="C586C0"/>
+                </a:solidFill>
+                <a:latin typeface="Consolas" panose="020B0609020204030204" pitchFamily="49" charset="0"/>
+              </a:rPr>
+              <a:t>import</a:t>
+            </a:r>
+            <a:r>
+              <a:rPr lang="en-US" sz="1600" dirty="0">
+                <a:solidFill>
+                  <a:srgbClr val="D4D4D4"/>
+                </a:solidFill>
+                <a:latin typeface="Consolas" panose="020B0609020204030204" pitchFamily="49" charset="0"/>
+              </a:rPr>
+              <a:t> { </a:t>
+            </a:r>
+            <a:r>
+              <a:rPr lang="en-US" sz="1600" dirty="0">
+                <a:solidFill>
+                  <a:srgbClr val="9CDCFE"/>
+                </a:solidFill>
+                <a:latin typeface="Consolas" panose="020B0609020204030204" pitchFamily="49" charset="0"/>
+              </a:rPr>
+              <a:t>Provider</a:t>
+            </a:r>
+            <a:r>
+              <a:rPr lang="en-US" sz="1600" dirty="0">
+                <a:solidFill>
+                  <a:srgbClr val="D4D4D4"/>
+                </a:solidFill>
+                <a:latin typeface="Consolas" panose="020B0609020204030204" pitchFamily="49" charset="0"/>
+              </a:rPr>
+              <a:t> } </a:t>
+            </a:r>
+            <a:r>
+              <a:rPr lang="en-US" sz="1600" dirty="0">
+                <a:solidFill>
+                  <a:srgbClr val="C586C0"/>
+                </a:solidFill>
+                <a:latin typeface="Consolas" panose="020B0609020204030204" pitchFamily="49" charset="0"/>
+              </a:rPr>
+              <a:t>from</a:t>
+            </a:r>
+            <a:r>
+              <a:rPr lang="en-US" sz="1600" dirty="0">
+                <a:solidFill>
+                  <a:srgbClr val="D4D4D4"/>
+                </a:solidFill>
+                <a:latin typeface="Consolas" panose="020B0609020204030204" pitchFamily="49" charset="0"/>
+              </a:rPr>
+              <a:t> </a:t>
+            </a:r>
+            <a:r>
+              <a:rPr lang="en-US" sz="1600" dirty="0">
+                <a:solidFill>
+                  <a:srgbClr val="CE9178"/>
+                </a:solidFill>
+                <a:latin typeface="Consolas" panose="020B0609020204030204" pitchFamily="49" charset="0"/>
+              </a:rPr>
+              <a:t>"react-redux"</a:t>
+            </a:r>
+            <a:r>
+              <a:rPr lang="en-US" sz="1600" dirty="0">
+                <a:solidFill>
+                  <a:srgbClr val="D4D4D4"/>
+                </a:solidFill>
+                <a:latin typeface="Consolas" panose="020B0609020204030204" pitchFamily="49" charset="0"/>
+              </a:rPr>
+              <a:t>;</a:t>
+            </a:r>
+          </a:p>
+          <a:p>
+            <a:r>
+              <a:rPr lang="en-US" sz="1600" dirty="0">
+                <a:solidFill>
+                  <a:srgbClr val="C586C0"/>
+                </a:solidFill>
+                <a:latin typeface="Consolas" panose="020B0609020204030204" pitchFamily="49" charset="0"/>
+              </a:rPr>
+              <a:t>import</a:t>
+            </a:r>
+            <a:r>
+              <a:rPr lang="en-US" sz="1600" dirty="0">
+                <a:solidFill>
+                  <a:srgbClr val="D4D4D4"/>
+                </a:solidFill>
+                <a:latin typeface="Consolas" panose="020B0609020204030204" pitchFamily="49" charset="0"/>
+              </a:rPr>
+              <a:t> </a:t>
+            </a:r>
+            <a:r>
+              <a:rPr lang="en-US" sz="1600" dirty="0">
+                <a:solidFill>
+                  <a:srgbClr val="569CD6"/>
+                </a:solidFill>
+                <a:latin typeface="Consolas" panose="020B0609020204030204" pitchFamily="49" charset="0"/>
+              </a:rPr>
+              <a:t>*</a:t>
+            </a:r>
+            <a:r>
+              <a:rPr lang="en-US" sz="1600" dirty="0">
+                <a:solidFill>
+                  <a:srgbClr val="D4D4D4"/>
+                </a:solidFill>
+                <a:latin typeface="Consolas" panose="020B0609020204030204" pitchFamily="49" charset="0"/>
+              </a:rPr>
+              <a:t> </a:t>
+            </a:r>
+            <a:r>
+              <a:rPr lang="en-US" sz="1600" dirty="0">
+                <a:solidFill>
+                  <a:srgbClr val="C586C0"/>
+                </a:solidFill>
+                <a:latin typeface="Consolas" panose="020B0609020204030204" pitchFamily="49" charset="0"/>
+              </a:rPr>
+              <a:t>as</a:t>
+            </a:r>
+            <a:r>
+              <a:rPr lang="en-US" sz="1600" dirty="0">
+                <a:solidFill>
+                  <a:srgbClr val="D4D4D4"/>
+                </a:solidFill>
+                <a:latin typeface="Consolas" panose="020B0609020204030204" pitchFamily="49" charset="0"/>
+              </a:rPr>
+              <a:t> </a:t>
+            </a:r>
+            <a:r>
+              <a:rPr lang="en-US" sz="1600" dirty="0">
+                <a:solidFill>
+                  <a:srgbClr val="9CDCFE"/>
+                </a:solidFill>
+                <a:latin typeface="Consolas" panose="020B0609020204030204" pitchFamily="49" charset="0"/>
+              </a:rPr>
+              <a:t>models</a:t>
+            </a:r>
+            <a:r>
+              <a:rPr lang="en-US" sz="1600" dirty="0">
+                <a:solidFill>
+                  <a:srgbClr val="D4D4D4"/>
+                </a:solidFill>
+                <a:latin typeface="Consolas" panose="020B0609020204030204" pitchFamily="49" charset="0"/>
+              </a:rPr>
+              <a:t> </a:t>
+            </a:r>
+            <a:r>
+              <a:rPr lang="en-US" sz="1600" dirty="0">
+                <a:solidFill>
+                  <a:srgbClr val="C586C0"/>
+                </a:solidFill>
+                <a:latin typeface="Consolas" panose="020B0609020204030204" pitchFamily="49" charset="0"/>
+              </a:rPr>
+              <a:t>from</a:t>
+            </a:r>
+            <a:r>
+              <a:rPr lang="en-US" sz="1600" dirty="0">
+                <a:solidFill>
+                  <a:srgbClr val="D4D4D4"/>
+                </a:solidFill>
+                <a:latin typeface="Consolas" panose="020B0609020204030204" pitchFamily="49" charset="0"/>
+              </a:rPr>
+              <a:t> </a:t>
+            </a:r>
+            <a:r>
+              <a:rPr lang="en-US" sz="1600" dirty="0">
+                <a:solidFill>
+                  <a:srgbClr val="CE9178"/>
+                </a:solidFill>
+                <a:latin typeface="Consolas" panose="020B0609020204030204" pitchFamily="49" charset="0"/>
+              </a:rPr>
+              <a:t>'./models'</a:t>
+            </a:r>
+            <a:r>
+              <a:rPr lang="en-US" sz="1600" dirty="0">
+                <a:solidFill>
+                  <a:srgbClr val="D4D4D4"/>
+                </a:solidFill>
+                <a:latin typeface="Consolas" panose="020B0609020204030204" pitchFamily="49" charset="0"/>
+              </a:rPr>
+              <a:t>;</a:t>
+            </a:r>
+          </a:p>
+          <a:p>
+            <a:br>
+              <a:rPr lang="en-US" sz="1600" dirty="0">
+                <a:solidFill>
+                  <a:srgbClr val="D4D4D4"/>
+                </a:solidFill>
+                <a:latin typeface="Consolas" panose="020B0609020204030204" pitchFamily="49" charset="0"/>
+              </a:rPr>
+            </a:br>
+            <a:r>
+              <a:rPr lang="en-US" sz="1600" dirty="0">
+                <a:solidFill>
+                  <a:srgbClr val="6A9955"/>
+                </a:solidFill>
+                <a:latin typeface="Consolas" panose="020B0609020204030204" pitchFamily="49" charset="0"/>
+              </a:rPr>
+              <a:t>// generate Redux store</a:t>
             </a:r>
             <a:endParaRPr lang="en-US" sz="1600" dirty="0">
               <a:solidFill>
-                <a:schemeClr val="accent6">
-                  <a:lumMod val="75000"/>
-                </a:schemeClr>
+                <a:srgbClr val="D4D4D4"/>
               </a:solidFill>
               <a:latin typeface="Consolas" panose="020B0609020204030204" pitchFamily="49" charset="0"/>
             </a:endParaRPr>
@@ -5101,11 +5396,11 @@
             <a:r>
               <a:rPr lang="en-US" sz="1600" dirty="0">
                 <a:solidFill>
-                  <a:srgbClr val="C586C0"/>
-                </a:solidFill>
-                <a:latin typeface="Consolas" panose="020B0609020204030204" pitchFamily="49" charset="0"/>
-              </a:rPr>
-              <a:t>export</a:t>
+                  <a:srgbClr val="569CD6"/>
+                </a:solidFill>
+                <a:latin typeface="Consolas" panose="020B0609020204030204" pitchFamily="49" charset="0"/>
+              </a:rPr>
+              <a:t>const</a:t>
             </a:r>
             <a:r>
               <a:rPr lang="en-US" sz="1600" dirty="0">
@@ -5119,11 +5414,216 @@
             <a:r>
               <a:rPr lang="en-US" sz="1600" dirty="0">
                 <a:solidFill>
+                  <a:srgbClr val="9CDCFE"/>
+                </a:solidFill>
+                <a:latin typeface="Consolas" panose="020B0609020204030204" pitchFamily="49" charset="0"/>
+              </a:rPr>
+              <a:t>store</a:t>
+            </a:r>
+            <a:r>
+              <a:rPr lang="en-US" sz="1600" dirty="0">
+                <a:solidFill>
+                  <a:srgbClr val="D4D4D4"/>
+                </a:solidFill>
+                <a:latin typeface="Consolas" panose="020B0609020204030204" pitchFamily="49" charset="0"/>
+              </a:rPr>
+              <a:t> = </a:t>
+            </a:r>
+            <a:r>
+              <a:rPr lang="en-US" sz="1600" dirty="0" err="1">
+                <a:solidFill>
+                  <a:srgbClr val="DCDCAA"/>
+                </a:solidFill>
+                <a:latin typeface="Consolas" panose="020B0609020204030204" pitchFamily="49" charset="0"/>
+              </a:rPr>
+              <a:t>init</a:t>
+            </a:r>
+            <a:r>
+              <a:rPr lang="en-US" sz="1600" dirty="0">
+                <a:solidFill>
+                  <a:srgbClr val="D4D4D4"/>
+                </a:solidFill>
+                <a:latin typeface="Consolas" panose="020B0609020204030204" pitchFamily="49" charset="0"/>
+              </a:rPr>
+              <a:t>({</a:t>
+            </a:r>
+          </a:p>
+          <a:p>
+            <a:r>
+              <a:rPr lang="en-US" sz="1600" dirty="0">
+                <a:solidFill>
+                  <a:srgbClr val="9CDCFE"/>
+                </a:solidFill>
+                <a:latin typeface="Consolas" panose="020B0609020204030204" pitchFamily="49" charset="0"/>
+              </a:rPr>
+              <a:t>  models</a:t>
+            </a:r>
+            <a:r>
+              <a:rPr lang="en-US" sz="1600" dirty="0">
+                <a:solidFill>
+                  <a:srgbClr val="D4D4D4"/>
+                </a:solidFill>
+                <a:latin typeface="Consolas" panose="020B0609020204030204" pitchFamily="49" charset="0"/>
+              </a:rPr>
+              <a:t>,</a:t>
+            </a:r>
+          </a:p>
+          <a:p>
+            <a:r>
+              <a:rPr lang="en-US" sz="1600" dirty="0">
+                <a:solidFill>
+                  <a:srgbClr val="D4D4D4"/>
+                </a:solidFill>
+                <a:latin typeface="Consolas" panose="020B0609020204030204" pitchFamily="49" charset="0"/>
+              </a:rPr>
+              <a:t>});</a:t>
+            </a:r>
+          </a:p>
+          <a:p>
+            <a:br>
+              <a:rPr lang="en-US" sz="1600" dirty="0">
+                <a:solidFill>
+                  <a:srgbClr val="D4D4D4"/>
+                </a:solidFill>
+                <a:latin typeface="Consolas" panose="020B0609020204030204" pitchFamily="49" charset="0"/>
+              </a:rPr>
+            </a:br>
+            <a:r>
+              <a:rPr lang="en-US" sz="1600" dirty="0" err="1">
+                <a:solidFill>
+                  <a:srgbClr val="9CDCFE"/>
+                </a:solidFill>
+                <a:latin typeface="Consolas" panose="020B0609020204030204" pitchFamily="49" charset="0"/>
+              </a:rPr>
+              <a:t>ReactDOM</a:t>
+            </a:r>
+            <a:r>
+              <a:rPr lang="en-US" sz="1600" dirty="0" err="1">
+                <a:solidFill>
+                  <a:srgbClr val="D4D4D4"/>
+                </a:solidFill>
+                <a:latin typeface="Consolas" panose="020B0609020204030204" pitchFamily="49" charset="0"/>
+              </a:rPr>
+              <a:t>.</a:t>
+            </a:r>
+            <a:r>
+              <a:rPr lang="en-US" sz="1600" dirty="0" err="1">
+                <a:solidFill>
+                  <a:srgbClr val="DCDCAA"/>
+                </a:solidFill>
+                <a:latin typeface="Consolas" panose="020B0609020204030204" pitchFamily="49" charset="0"/>
+              </a:rPr>
+              <a:t>render</a:t>
+            </a:r>
+            <a:r>
+              <a:rPr lang="en-US" sz="1600" dirty="0">
+                <a:solidFill>
+                  <a:srgbClr val="D4D4D4"/>
+                </a:solidFill>
+                <a:latin typeface="Consolas" panose="020B0609020204030204" pitchFamily="49" charset="0"/>
+              </a:rPr>
+              <a:t>(</a:t>
+            </a:r>
+          </a:p>
+          <a:p>
+            <a:r>
+              <a:rPr lang="en-US" sz="1600" dirty="0">
+                <a:solidFill>
+                  <a:srgbClr val="D4D4D4"/>
+                </a:solidFill>
+                <a:latin typeface="Consolas" panose="020B0609020204030204" pitchFamily="49" charset="0"/>
+              </a:rPr>
+              <a:t>  </a:t>
+            </a:r>
+            <a:r>
+              <a:rPr lang="en-US" sz="1600" dirty="0">
+                <a:solidFill>
+                  <a:srgbClr val="808080"/>
+                </a:solidFill>
+                <a:latin typeface="Consolas" panose="020B0609020204030204" pitchFamily="49" charset="0"/>
+              </a:rPr>
+              <a:t>&lt;</a:t>
+            </a:r>
+            <a:r>
+              <a:rPr lang="en-US" sz="1600" dirty="0">
+                <a:solidFill>
+                  <a:srgbClr val="4EC9B0"/>
+                </a:solidFill>
+                <a:latin typeface="Consolas" panose="020B0609020204030204" pitchFamily="49" charset="0"/>
+              </a:rPr>
+              <a:t>Provider</a:t>
+            </a:r>
+            <a:r>
+              <a:rPr lang="en-US" sz="1600" dirty="0">
+                <a:solidFill>
+                  <a:srgbClr val="D4D4D4"/>
+                </a:solidFill>
+                <a:latin typeface="Consolas" panose="020B0609020204030204" pitchFamily="49" charset="0"/>
+              </a:rPr>
+              <a:t> </a:t>
+            </a:r>
+            <a:r>
+              <a:rPr lang="en-US" sz="1600" dirty="0">
+                <a:solidFill>
+                  <a:srgbClr val="9CDCFE"/>
+                </a:solidFill>
+                <a:latin typeface="Consolas" panose="020B0609020204030204" pitchFamily="49" charset="0"/>
+              </a:rPr>
+              <a:t>store</a:t>
+            </a:r>
+            <a:r>
+              <a:rPr lang="en-US" sz="1600" dirty="0">
+                <a:solidFill>
+                  <a:srgbClr val="D4D4D4"/>
+                </a:solidFill>
+                <a:latin typeface="Consolas" panose="020B0609020204030204" pitchFamily="49" charset="0"/>
+              </a:rPr>
+              <a:t>=</a:t>
+            </a:r>
+            <a:r>
+              <a:rPr lang="en-US" sz="1600" dirty="0">
+                <a:solidFill>
                   <a:srgbClr val="569CD6"/>
                 </a:solidFill>
                 <a:latin typeface="Consolas" panose="020B0609020204030204" pitchFamily="49" charset="0"/>
               </a:rPr>
-              <a:t>const</a:t>
+              <a:t>{</a:t>
+            </a:r>
+            <a:r>
+              <a:rPr lang="en-US" sz="1600" dirty="0">
+                <a:solidFill>
+                  <a:srgbClr val="9CDCFE"/>
+                </a:solidFill>
+                <a:latin typeface="Consolas" panose="020B0609020204030204" pitchFamily="49" charset="0"/>
+              </a:rPr>
+              <a:t>store</a:t>
+            </a:r>
+            <a:r>
+              <a:rPr lang="en-US" sz="1600" dirty="0">
+                <a:solidFill>
+                  <a:srgbClr val="569CD6"/>
+                </a:solidFill>
+                <a:latin typeface="Consolas" panose="020B0609020204030204" pitchFamily="49" charset="0"/>
+              </a:rPr>
+              <a:t>}</a:t>
+            </a:r>
+            <a:r>
+              <a:rPr lang="en-US" sz="1600" dirty="0">
+                <a:solidFill>
+                  <a:srgbClr val="808080"/>
+                </a:solidFill>
+                <a:latin typeface="Consolas" panose="020B0609020204030204" pitchFamily="49" charset="0"/>
+              </a:rPr>
+              <a:t>&gt;&lt;</a:t>
+            </a:r>
+            <a:r>
+              <a:rPr lang="en-US" sz="1600" dirty="0">
+                <a:solidFill>
+                  <a:srgbClr val="4EC9B0"/>
+                </a:solidFill>
+                <a:latin typeface="Consolas" panose="020B0609020204030204" pitchFamily="49" charset="0"/>
+              </a:rPr>
+              <a:t>App</a:t>
             </a:r>
             <a:r>
               <a:rPr lang="en-US" sz="1600" dirty="0">
@@ -5135,33 +5635,78 @@
               <a:t> </a:t>
             </a:r>
             <a:r>
+              <a:rPr lang="en-US" sz="1600" dirty="0">
+                <a:solidFill>
+                  <a:srgbClr val="808080"/>
+                </a:solidFill>
+                <a:latin typeface="Consolas" panose="020B0609020204030204" pitchFamily="49" charset="0"/>
+              </a:rPr>
+              <a:t>/&gt;&lt;/</a:t>
+            </a:r>
+            <a:r>
+              <a:rPr lang="en-US" sz="1600" dirty="0">
+                <a:solidFill>
+                  <a:srgbClr val="4EC9B0"/>
+                </a:solidFill>
+                <a:latin typeface="Consolas" panose="020B0609020204030204" pitchFamily="49" charset="0"/>
+              </a:rPr>
+              <a:t>Provider</a:t>
+            </a:r>
+            <a:r>
+              <a:rPr lang="en-US" sz="1600" dirty="0">
+                <a:solidFill>
+                  <a:srgbClr val="808080"/>
+                </a:solidFill>
+                <a:latin typeface="Consolas" panose="020B0609020204030204" pitchFamily="49" charset="0"/>
+              </a:rPr>
+              <a:t>&gt;</a:t>
+            </a:r>
+            <a:r>
+              <a:rPr lang="en-US" sz="1600" dirty="0">
+                <a:solidFill>
+                  <a:srgbClr val="D4D4D4"/>
+                </a:solidFill>
+                <a:latin typeface="Consolas" panose="020B0609020204030204" pitchFamily="49" charset="0"/>
+              </a:rPr>
+              <a:t>,</a:t>
+            </a:r>
+          </a:p>
+          <a:p>
+            <a:r>
+              <a:rPr lang="en-US" sz="1600" dirty="0">
+                <a:solidFill>
+                  <a:srgbClr val="D4D4D4"/>
+                </a:solidFill>
+                <a:latin typeface="Consolas" panose="020B0609020204030204" pitchFamily="49" charset="0"/>
+              </a:rPr>
+              <a:t>  </a:t>
+            </a:r>
+            <a:r>
               <a:rPr lang="en-US" sz="1600" dirty="0" err="1">
                 <a:solidFill>
                   <a:srgbClr val="9CDCFE"/>
                 </a:solidFill>
                 <a:latin typeface="Consolas" panose="020B0609020204030204" pitchFamily="49" charset="0"/>
               </a:rPr>
-              <a:t>user_token</a:t>
-            </a:r>
-            <a:r>
-              <a:rPr lang="en-US" sz="1600" dirty="0">
+              <a:t>document</a:t>
+            </a:r>
+            <a:r>
+              <a:rPr lang="en-US" sz="1600" dirty="0" err="1">
                 <a:solidFill>
                   <a:srgbClr val="D4D4D4"/>
                 </a:solidFill>
                 <a:latin typeface="Consolas" panose="020B0609020204030204" pitchFamily="49" charset="0"/>
               </a:rPr>
-              <a:t> = {</a:t>
-            </a:r>
-          </a:p>
-          <a:p>
-            <a:r>
-              <a:rPr lang="en-US" sz="1600" dirty="0">
-                <a:solidFill>
-                  <a:srgbClr val="9CDCFE"/>
-                </a:solidFill>
-                <a:latin typeface="Consolas" panose="020B0609020204030204" pitchFamily="49" charset="0"/>
-              </a:rPr>
-              <a:t>  state:</a:t>
+              <a:t>.</a:t>
+            </a:r>
+            <a:r>
+              <a:rPr lang="en-US" sz="1600" dirty="0" err="1">
+                <a:solidFill>
+                  <a:srgbClr val="DCDCAA"/>
+                </a:solidFill>
+                <a:latin typeface="Consolas" panose="020B0609020204030204" pitchFamily="49" charset="0"/>
+              </a:rPr>
+              <a:t>getElementById</a:t>
             </a:r>
             <a:r>
               <a:rPr lang="en-US" sz="1600" dirty="0">
@@ -5170,10 +5715,17 @@
                 </a:solidFill>
                 <a:latin typeface="Consolas" panose="020B0609020204030204" pitchFamily="49" charset="0"/>
               </a:rPr>
-              <a:t> null,</a:t>
-            </a:r>
-          </a:p>
-          <a:p>
+              <a:t>(</a:t>
+            </a:r>
+            <a:r>
+              <a:rPr lang="en-US" sz="1600" dirty="0">
+                <a:solidFill>
+                  <a:srgbClr val="CE9178"/>
+                </a:solidFill>
+                <a:latin typeface="Consolas" panose="020B0609020204030204" pitchFamily="49" charset="0"/>
+              </a:rPr>
+              <a:t>'root'</a:t>
+            </a:r>
             <a:r>
               <a:rPr lang="en-US" sz="1600" dirty="0">
                 <a:solidFill>
@@ -5181,7 +5733,18 @@
                 </a:solidFill>
                 <a:latin typeface="Consolas" panose="020B0609020204030204" pitchFamily="49" charset="0"/>
               </a:rPr>
-              <a:t>};</a:t>
+              <a:t>)</a:t>
+            </a:r>
+          </a:p>
+          <a:p>
+            <a:r>
+              <a:rPr lang="en-US" sz="1600" dirty="0">
+                <a:solidFill>
+                  <a:srgbClr val="D4D4D4"/>
+                </a:solidFill>
+                <a:latin typeface="Consolas" panose="020B0609020204030204" pitchFamily="49" charset="0"/>
+              </a:rPr>
+              <a:t>);</a:t>
             </a:r>
             <a:endParaRPr lang="en-US" sz="1600" b="0" dirty="0">
               <a:solidFill>
@@ -5193,174 +5756,10 @@
           </a:p>
         </p:txBody>
       </p:sp>
-      <p:sp>
-        <p:nvSpPr>
-          <p:cNvPr id="16" name="矩形 15">
-            <a:extLst>
-              <a:ext uri="{FF2B5EF4-FFF2-40B4-BE49-F238E27FC236}">
-                <a16:creationId xmlns:a16="http://schemas.microsoft.com/office/drawing/2014/main" id="{41E7C553-A3A3-444B-B4CE-BB6B9C5B9BC1}"/>
-              </a:ext>
-            </a:extLst>
-          </p:cNvPr>
-          <p:cNvSpPr/>
-          <p:nvPr/>
-        </p:nvSpPr>
-        <p:spPr>
-          <a:xfrm>
-            <a:off x="2787090" y="3828625"/>
-            <a:ext cx="7037824" cy="369332"/>
-          </a:xfrm>
-          <a:prstGeom prst="rect">
-            <a:avLst/>
-          </a:prstGeom>
-        </p:spPr>
-        <p:txBody>
-          <a:bodyPr wrap="none">
-            <a:spAutoFit/>
-          </a:bodyPr>
-          <a:lstStyle/>
-          <a:p>
-            <a:r>
-              <a:rPr lang="zh-CN" altLang="en-US" dirty="0">
-                <a:solidFill>
-                  <a:schemeClr val="bg1"/>
-                </a:solidFill>
-              </a:rPr>
-              <a:t>会在</a:t>
-            </a:r>
-            <a:r>
-              <a:rPr lang="en-US" altLang="zh-CN" dirty="0">
-                <a:solidFill>
-                  <a:schemeClr val="bg1"/>
-                </a:solidFill>
-              </a:rPr>
-              <a:t>redux store</a:t>
-            </a:r>
-            <a:r>
-              <a:rPr lang="zh-CN" altLang="en-US" dirty="0">
-                <a:solidFill>
-                  <a:schemeClr val="bg1"/>
-                </a:solidFill>
-              </a:rPr>
-              <a:t>中生成一个键值对，键名是</a:t>
-            </a:r>
-            <a:r>
-              <a:rPr lang="en-US" altLang="zh-CN" dirty="0" err="1">
-                <a:solidFill>
-                  <a:schemeClr val="bg1"/>
-                </a:solidFill>
-              </a:rPr>
-              <a:t>user_token</a:t>
-            </a:r>
-            <a:r>
-              <a:rPr lang="zh-CN" altLang="en-US" dirty="0">
-                <a:solidFill>
-                  <a:schemeClr val="bg1"/>
-                </a:solidFill>
-              </a:rPr>
-              <a:t>，初始值为</a:t>
-            </a:r>
-            <a:r>
-              <a:rPr lang="en-US" altLang="zh-CN" dirty="0">
-                <a:solidFill>
-                  <a:schemeClr val="bg1"/>
-                </a:solidFill>
-              </a:rPr>
-              <a:t>null</a:t>
-            </a:r>
-            <a:endParaRPr lang="en-US" dirty="0">
-              <a:solidFill>
-                <a:schemeClr val="bg1"/>
-              </a:solidFill>
-            </a:endParaRPr>
-          </a:p>
-        </p:txBody>
-      </p:sp>
-      <p:sp>
-        <p:nvSpPr>
-          <p:cNvPr id="17" name="Rectangle 3">
-            <a:extLst>
-              <a:ext uri="{FF2B5EF4-FFF2-40B4-BE49-F238E27FC236}">
-                <a16:creationId xmlns:a16="http://schemas.microsoft.com/office/drawing/2014/main" id="{36CA20FA-DE4C-42E9-99FC-BBCDA96F2C6D}"/>
-              </a:ext>
-            </a:extLst>
-          </p:cNvPr>
-          <p:cNvSpPr/>
-          <p:nvPr/>
-        </p:nvSpPr>
-        <p:spPr>
-          <a:xfrm rot="10800000">
-            <a:off x="2741371" y="3784691"/>
-            <a:ext cx="45719" cy="457200"/>
-          </a:xfrm>
-          <a:prstGeom prst="rect">
-            <a:avLst/>
-          </a:prstGeom>
-          <a:solidFill>
-            <a:srgbClr val="FFA400"/>
-          </a:solidFill>
-          <a:ln>
-            <a:noFill/>
-          </a:ln>
-        </p:spPr>
-        <p:style>
-          <a:lnRef idx="2">
-            <a:schemeClr val="accent1">
-              <a:shade val="50000"/>
-            </a:schemeClr>
-          </a:lnRef>
-          <a:fillRef idx="1">
-            <a:schemeClr val="accent1"/>
-          </a:fillRef>
-          <a:effectRef idx="0">
-            <a:schemeClr val="accent1"/>
-          </a:effectRef>
-          <a:fontRef idx="minor">
-            <a:schemeClr val="lt1"/>
-          </a:fontRef>
-        </p:style>
-        <p:txBody>
-          <a:bodyPr rtlCol="0" anchor="ctr"/>
-          <a:lstStyle/>
-          <a:p>
-            <a:pPr marL="0" marR="0" lvl="0" indent="0" algn="ctr" defTabSz="914400" rtl="0" eaLnBrk="1" fontAlgn="auto" latinLnBrk="0" hangingPunct="1">
-              <a:lnSpc>
-                <a:spcPct val="100000"/>
-              </a:lnSpc>
-              <a:spcBef>
-                <a:spcPts val="0"/>
-              </a:spcBef>
-              <a:spcAft>
-                <a:spcPts val="0"/>
-              </a:spcAft>
-              <a:buClrTx/>
-              <a:buSzTx/>
-              <a:buFontTx/>
-              <a:buNone/>
-              <a:tabLst/>
-              <a:defRPr/>
-            </a:pPr>
-            <a:endParaRPr kumimoji="0" lang="en-US" sz="1800" b="0" i="0" u="none" strike="noStrike" kern="1200" cap="none" spc="0" normalizeH="0" baseline="0" noProof="0">
-              <a:ln>
-                <a:noFill/>
-              </a:ln>
-              <a:solidFill>
-                <a:prstClr val="white"/>
-              </a:solidFill>
-              <a:effectLst/>
-              <a:uLnTx/>
-              <a:uFillTx/>
-              <a:latin typeface="Calibri" panose="020F0502020204030204"/>
-              <a:ea typeface="+mn-ea"/>
-              <a:cs typeface="+mn-cs"/>
-            </a:endParaRPr>
-          </a:p>
-        </p:txBody>
-      </p:sp>
     </p:spTree>
     <p:extLst>
       <p:ext uri="{BB962C8B-B14F-4D97-AF65-F5344CB8AC3E}">
-        <p14:creationId xmlns:p14="http://schemas.microsoft.com/office/powerpoint/2010/main" val="3951899454"/>
+        <p14:creationId xmlns:p14="http://schemas.microsoft.com/office/powerpoint/2010/main" val="3161449029"/>
       </p:ext>
     </p:extLst>
   </p:cSld>
@@ -5556,7 +5955,7 @@
         <p:spPr>
           <a:xfrm>
             <a:off x="345731" y="2595914"/>
-            <a:ext cx="1776032" cy="1200329"/>
+            <a:ext cx="1776032" cy="830997"/>
           </a:xfrm>
           <a:prstGeom prst="rect">
             <a:avLst/>
@@ -5587,32 +5986,26 @@
               <a:defRPr/>
             </a:pPr>
             <a:r>
-              <a:rPr kumimoji="0" lang="en-US" altLang="zh-CN" sz="2400" b="0" i="0" u="none" strike="noStrike" kern="1200" cap="none" spc="0" normalizeH="0" baseline="0" noProof="0" dirty="0">
-                <a:ln>
-                  <a:noFill/>
-                </a:ln>
+              <a:rPr lang="en-US" altLang="zh-CN" sz="2400" dirty="0">
                 <a:solidFill>
                   <a:prstClr val="white"/>
                 </a:solidFill>
-                <a:effectLst/>
-                <a:uLnTx/>
-                <a:uFillTx/>
                 <a:latin typeface="Calibri" panose="020F0502020204030204"/>
                 <a:ea typeface="等线" panose="02010600030101010101" pitchFamily="2" charset="-122"/>
-                <a:cs typeface="+mn-cs"/>
-              </a:rPr>
-              <a:t>Create Reducers</a:t>
-            </a:r>
-            <a:r>
-              <a:rPr lang="en-US" altLang="zh-CN" sz="2400" dirty="0">
+              </a:rPr>
+              <a:t>Create A </a:t>
+            </a:r>
+            <a:r>
+              <a:rPr lang="en-US" sz="2400" dirty="0">
                 <a:solidFill>
                   <a:prstClr val="white"/>
                 </a:solidFill>
                 <a:latin typeface="Calibri" panose="020F0502020204030204"/>
-              </a:rPr>
-              <a:t> in the Model</a:t>
-            </a:r>
-            <a:endParaRPr kumimoji="0" lang="en-US" altLang="zh-CN" sz="2400" b="0" i="0" u="none" strike="noStrike" kern="1200" cap="none" spc="0" normalizeH="0" baseline="0" noProof="0" dirty="0">
+                <a:ea typeface="等线" panose="02010600030101010101" pitchFamily="2" charset="-122"/>
+              </a:rPr>
+              <a:t>Model</a:t>
+            </a:r>
+            <a:endParaRPr kumimoji="0" lang="en-US" sz="2400" b="0" i="0" u="none" strike="noStrike" kern="1200" cap="none" spc="0" normalizeH="0" baseline="0" noProof="0" dirty="0">
               <a:ln>
                 <a:noFill/>
               </a:ln>
@@ -5623,7 +6016,7 @@
               <a:uLnTx/>
               <a:uFillTx/>
               <a:latin typeface="Calibri" panose="020F0502020204030204"/>
-              <a:ea typeface="等线" panose="02010600030101010101" pitchFamily="2" charset="-122"/>
+              <a:ea typeface="+mn-ea"/>
               <a:cs typeface="+mn-cs"/>
             </a:endParaRPr>
           </a:p>
@@ -5667,10 +6060,10 @@
       </p:pic>
       <p:sp>
         <p:nvSpPr>
-          <p:cNvPr id="3" name="矩形 2">
-            <a:extLst>
-              <a:ext uri="{FF2B5EF4-FFF2-40B4-BE49-F238E27FC236}">
-                <a16:creationId xmlns:a16="http://schemas.microsoft.com/office/drawing/2014/main" id="{72FC8815-CAE3-4D1B-A137-03270E75D742}"/>
+          <p:cNvPr id="2" name="矩形 1">
+            <a:extLst>
+              <a:ext uri="{FF2B5EF4-FFF2-40B4-BE49-F238E27FC236}">
+                <a16:creationId xmlns:a16="http://schemas.microsoft.com/office/drawing/2014/main" id="{BCA2521E-563E-47D0-9AC2-2C559DCC2E08}"/>
               </a:ext>
             </a:extLst>
           </p:cNvPr>
@@ -5679,8 +6072,8 @@
         </p:nvSpPr>
         <p:spPr>
           <a:xfrm>
-            <a:off x="2787090" y="1590500"/>
-            <a:ext cx="6096000" cy="2062103"/>
+            <a:off x="2787090" y="2349693"/>
+            <a:ext cx="6096000" cy="1107996"/>
           </a:xfrm>
           <a:prstGeom prst="rect">
             <a:avLst/>
@@ -5704,7 +6097,9 @@
             </a:r>
             <a:endParaRPr lang="en-US" sz="1600" dirty="0">
               <a:solidFill>
-                <a:srgbClr val="C586C0"/>
+                <a:schemeClr val="accent6">
+                  <a:lumMod val="75000"/>
+                </a:schemeClr>
               </a:solidFill>
               <a:latin typeface="Consolas" panose="020B0609020204030204" pitchFamily="49" charset="0"/>
             </a:endParaRPr>
@@ -5782,17 +6177,10 @@
                 </a:solidFill>
                 <a:latin typeface="Consolas" panose="020B0609020204030204" pitchFamily="49" charset="0"/>
               </a:rPr>
-              <a:t> </a:t>
-            </a:r>
-            <a:r>
-              <a:rPr lang="en-US" sz="1600" dirty="0">
-                <a:solidFill>
-                  <a:srgbClr val="569CD6"/>
-                </a:solidFill>
-                <a:latin typeface="Consolas" panose="020B0609020204030204" pitchFamily="49" charset="0"/>
-              </a:rPr>
-              <a:t>null</a:t>
-            </a:r>
+              <a:t> null,</a:t>
+            </a:r>
+          </a:p>
+          <a:p>
             <a:r>
               <a:rPr lang="en-US" sz="1600" dirty="0">
                 <a:solidFill>
@@ -5800,153 +6188,24 @@
                 </a:solidFill>
                 <a:latin typeface="Consolas" panose="020B0609020204030204" pitchFamily="49" charset="0"/>
               </a:rPr>
-              <a:t>,</a:t>
-            </a:r>
-          </a:p>
-          <a:p>
-            <a:r>
-              <a:rPr lang="en-US" sz="1600" dirty="0">
-                <a:solidFill>
-                  <a:srgbClr val="9CDCFE"/>
-                </a:solidFill>
-                <a:latin typeface="Consolas" panose="020B0609020204030204" pitchFamily="49" charset="0"/>
-              </a:rPr>
-              <a:t>  reducers:</a:t>
-            </a:r>
-            <a:r>
-              <a:rPr lang="en-US" sz="1600" dirty="0">
-                <a:solidFill>
-                  <a:srgbClr val="D4D4D4"/>
-                </a:solidFill>
-                <a:latin typeface="Consolas" panose="020B0609020204030204" pitchFamily="49" charset="0"/>
-              </a:rPr>
-              <a:t> {</a:t>
-            </a:r>
-          </a:p>
-          <a:p>
-            <a:r>
-              <a:rPr lang="en-US" sz="1600" dirty="0">
-                <a:solidFill>
-                  <a:srgbClr val="DCDCAA"/>
-                </a:solidFill>
-                <a:latin typeface="Consolas" panose="020B0609020204030204" pitchFamily="49" charset="0"/>
-              </a:rPr>
-              <a:t>    set</a:t>
-            </a:r>
-            <a:r>
-              <a:rPr lang="en-US" sz="1600" dirty="0">
-                <a:solidFill>
-                  <a:srgbClr val="D4D4D4"/>
-                </a:solidFill>
-                <a:latin typeface="Consolas" panose="020B0609020204030204" pitchFamily="49" charset="0"/>
-              </a:rPr>
-              <a:t>(</a:t>
-            </a:r>
-            <a:r>
-              <a:rPr lang="en-US" sz="1600" dirty="0">
-                <a:solidFill>
-                  <a:srgbClr val="9CDCFE"/>
-                </a:solidFill>
-                <a:latin typeface="Consolas" panose="020B0609020204030204" pitchFamily="49" charset="0"/>
-              </a:rPr>
-              <a:t>state</a:t>
-            </a:r>
-            <a:r>
-              <a:rPr lang="en-US" sz="1600" dirty="0">
-                <a:solidFill>
-                  <a:srgbClr val="D4D4D4"/>
-                </a:solidFill>
-                <a:latin typeface="Consolas" panose="020B0609020204030204" pitchFamily="49" charset="0"/>
-              </a:rPr>
-              <a:t>, </a:t>
-            </a:r>
-            <a:r>
-              <a:rPr lang="en-US" sz="1600" dirty="0">
-                <a:solidFill>
-                  <a:srgbClr val="9CDCFE"/>
-                </a:solidFill>
-                <a:latin typeface="Consolas" panose="020B0609020204030204" pitchFamily="49" charset="0"/>
-              </a:rPr>
-              <a:t>payload</a:t>
-            </a:r>
-            <a:r>
-              <a:rPr lang="en-US" sz="1600" dirty="0">
-                <a:solidFill>
-                  <a:srgbClr val="D4D4D4"/>
-                </a:solidFill>
-                <a:latin typeface="Consolas" panose="020B0609020204030204" pitchFamily="49" charset="0"/>
-              </a:rPr>
-              <a:t>) {</a:t>
-            </a:r>
-          </a:p>
-          <a:p>
-            <a:r>
-              <a:rPr lang="en-US" sz="1600" dirty="0">
-                <a:solidFill>
-                  <a:srgbClr val="C586C0"/>
-                </a:solidFill>
-                <a:latin typeface="Consolas" panose="020B0609020204030204" pitchFamily="49" charset="0"/>
-              </a:rPr>
-              <a:t>      return</a:t>
-            </a:r>
-            <a:r>
-              <a:rPr lang="en-US" sz="1600" dirty="0">
-                <a:solidFill>
-                  <a:srgbClr val="D4D4D4"/>
-                </a:solidFill>
-                <a:latin typeface="Consolas" panose="020B0609020204030204" pitchFamily="49" charset="0"/>
-              </a:rPr>
-              <a:t> </a:t>
-            </a:r>
-            <a:r>
-              <a:rPr lang="en-US" sz="1600" dirty="0">
-                <a:solidFill>
-                  <a:srgbClr val="9CDCFE"/>
-                </a:solidFill>
-                <a:latin typeface="Consolas" panose="020B0609020204030204" pitchFamily="49" charset="0"/>
-              </a:rPr>
-              <a:t>payload</a:t>
-            </a:r>
-            <a:r>
-              <a:rPr lang="en-US" sz="1600" dirty="0">
-                <a:solidFill>
-                  <a:srgbClr val="D4D4D4"/>
-                </a:solidFill>
-                <a:latin typeface="Consolas" panose="020B0609020204030204" pitchFamily="49" charset="0"/>
-              </a:rPr>
-              <a:t>;</a:t>
-            </a:r>
-          </a:p>
-          <a:p>
-            <a:r>
-              <a:rPr lang="en-US" sz="1600" dirty="0">
-                <a:solidFill>
-                  <a:srgbClr val="D4D4D4"/>
-                </a:solidFill>
-                <a:latin typeface="Consolas" panose="020B0609020204030204" pitchFamily="49" charset="0"/>
-              </a:rPr>
-              <a:t>  }</a:t>
-            </a:r>
-          </a:p>
-          <a:p>
-            <a:r>
-              <a:rPr lang="en-US" sz="1600" dirty="0">
-                <a:solidFill>
-                  <a:srgbClr val="D4D4D4"/>
-                </a:solidFill>
-                <a:latin typeface="Consolas" panose="020B0609020204030204" pitchFamily="49" charset="0"/>
-              </a:rPr>
-              <a:t>},</a:t>
-            </a:r>
-          </a:p>
-        </p:txBody>
-      </p:sp>
-      <p:sp>
-        <p:nvSpPr>
-          <p:cNvPr id="9" name="矩形 8">
-            <a:extLst>
-              <a:ext uri="{FF2B5EF4-FFF2-40B4-BE49-F238E27FC236}">
-                <a16:creationId xmlns:a16="http://schemas.microsoft.com/office/drawing/2014/main" id="{BCE22B8E-F1DA-43FD-8978-B2F593528294}"/>
+              <a:t>};</a:t>
+            </a:r>
+            <a:endParaRPr lang="en-US" sz="1600" b="0" dirty="0">
+              <a:solidFill>
+                <a:srgbClr val="D4D4D4"/>
+              </a:solidFill>
+              <a:effectLst/>
+              <a:latin typeface="Consolas" panose="020B0609020204030204" pitchFamily="49" charset="0"/>
+            </a:endParaRPr>
+          </a:p>
+        </p:txBody>
+      </p:sp>
+      <p:sp>
+        <p:nvSpPr>
+          <p:cNvPr id="16" name="矩形 15">
+            <a:extLst>
+              <a:ext uri="{FF2B5EF4-FFF2-40B4-BE49-F238E27FC236}">
+                <a16:creationId xmlns:a16="http://schemas.microsoft.com/office/drawing/2014/main" id="{41E7C553-A3A3-444B-B4CE-BB6B9C5B9BC1}"/>
               </a:ext>
             </a:extLst>
           </p:cNvPr>
@@ -5955,8 +6214,8 @@
         </p:nvSpPr>
         <p:spPr>
           <a:xfrm>
-            <a:off x="2832809" y="4235118"/>
-            <a:ext cx="7003840" cy="369332"/>
+            <a:off x="2787090" y="3828625"/>
+            <a:ext cx="7037824" cy="369332"/>
           </a:xfrm>
           <a:prstGeom prst="rect">
             <a:avLst/>
@@ -5969,12 +6228,20 @@
           <a:lstStyle/>
           <a:p>
             <a:r>
+              <a:rPr lang="zh-CN" altLang="en-US" dirty="0">
+                <a:solidFill>
+                  <a:schemeClr val="bg1"/>
+                </a:solidFill>
+              </a:rPr>
+              <a:t>会在</a:t>
+            </a:r>
+            <a:r>
               <a:rPr lang="en-US" altLang="zh-CN" dirty="0">
                 <a:solidFill>
                   <a:schemeClr val="bg1"/>
                 </a:solidFill>
               </a:rPr>
-              <a:t>state</a:t>
+              <a:t>redux store</a:t>
             </a:r>
             <a:r>
               <a:rPr lang="zh-CN" altLang="en-US" dirty="0">
@@ -5982,7 +6249,23 @@
                   <a:schemeClr val="bg1"/>
                 </a:solidFill>
               </a:rPr>
-              <a:t>的值是当前</a:t>
+              <a:t>中生成一个键值对，键名是</a:t>
+            </a:r>
+            <a:r>
+              <a:rPr lang="en-US" altLang="zh-CN" dirty="0" err="1">
+                <a:solidFill>
+                  <a:schemeClr val="bg1"/>
+                </a:solidFill>
+              </a:rPr>
+              <a:t>user_token</a:t>
+            </a:r>
+            <a:r>
+              <a:rPr lang="zh-CN" altLang="en-US" dirty="0">
+                <a:solidFill>
+                  <a:schemeClr val="bg1"/>
+                </a:solidFill>
+              </a:rPr>
+              <a:t>，初始值为</a:t>
             </a:r>
             <a:r>
               <a:rPr lang="en-US" altLang="zh-CN" dirty="0">
@@ -5990,47 +6273,7 @@
                   <a:schemeClr val="bg1"/>
                 </a:solidFill>
               </a:rPr>
-              <a:t>redux store</a:t>
-            </a:r>
-            <a:r>
-              <a:rPr lang="zh-CN" altLang="en-US" dirty="0">
-                <a:solidFill>
-                  <a:schemeClr val="bg1"/>
-                </a:solidFill>
-              </a:rPr>
-              <a:t>中</a:t>
-            </a:r>
-            <a:r>
-              <a:rPr lang="en-US" altLang="zh-CN" dirty="0" err="1">
-                <a:solidFill>
-                  <a:schemeClr val="bg1"/>
-                </a:solidFill>
-              </a:rPr>
-              <a:t>user_token</a:t>
-            </a:r>
-            <a:r>
-              <a:rPr lang="zh-CN" altLang="en-US" dirty="0">
-                <a:solidFill>
-                  <a:schemeClr val="bg1"/>
-                </a:solidFill>
-              </a:rPr>
-              <a:t>的值，由</a:t>
-            </a:r>
-            <a:r>
-              <a:rPr lang="en-US" altLang="zh-CN" dirty="0">
-                <a:solidFill>
-                  <a:schemeClr val="bg1"/>
-                </a:solidFill>
-              </a:rPr>
-              <a:t>rematch</a:t>
-            </a:r>
-            <a:r>
-              <a:rPr lang="zh-CN" altLang="en-US" dirty="0">
-                <a:solidFill>
-                  <a:schemeClr val="bg1"/>
-                </a:solidFill>
-              </a:rPr>
-              <a:t>自动填充</a:t>
+              <a:t>null</a:t>
             </a:r>
             <a:endParaRPr lang="en-US" dirty="0">
               <a:solidFill>
@@ -6042,10 +6285,10 @@
       </p:sp>
       <p:sp>
         <p:nvSpPr>
-          <p:cNvPr id="13" name="Rectangle 3">
-            <a:extLst>
-              <a:ext uri="{FF2B5EF4-FFF2-40B4-BE49-F238E27FC236}">
-                <a16:creationId xmlns:a16="http://schemas.microsoft.com/office/drawing/2014/main" id="{9E5DE49E-6804-45C4-8726-9FBF345765F3}"/>
+          <p:cNvPr id="17" name="Rectangle 3">
+            <a:extLst>
+              <a:ext uri="{FF2B5EF4-FFF2-40B4-BE49-F238E27FC236}">
+                <a16:creationId xmlns:a16="http://schemas.microsoft.com/office/drawing/2014/main" id="{36CA20FA-DE4C-42E9-99FC-BBCDA96F2C6D}"/>
               </a:ext>
             </a:extLst>
           </p:cNvPr>
@@ -6054,7 +6297,7 @@
         </p:nvSpPr>
         <p:spPr>
           <a:xfrm rot="10800000">
-            <a:off x="2787090" y="4191184"/>
+            <a:off x="2741371" y="3784691"/>
             <a:ext cx="45719" cy="457200"/>
           </a:xfrm>
           <a:prstGeom prst="rect">
@@ -6121,197 +6364,10 @@
           </a:p>
         </p:txBody>
       </p:sp>
-      <p:sp>
-        <p:nvSpPr>
-          <p:cNvPr id="14" name="矩形 13">
-            <a:extLst>
-              <a:ext uri="{FF2B5EF4-FFF2-40B4-BE49-F238E27FC236}">
-                <a16:creationId xmlns:a16="http://schemas.microsoft.com/office/drawing/2014/main" id="{A229A1CC-617F-4EAE-9844-21C532C2A229}"/>
-              </a:ext>
-            </a:extLst>
-          </p:cNvPr>
-          <p:cNvSpPr/>
-          <p:nvPr/>
-        </p:nvSpPr>
-        <p:spPr>
-          <a:xfrm>
-            <a:off x="2832809" y="4780472"/>
-            <a:ext cx="5808706" cy="369332"/>
-          </a:xfrm>
-          <a:prstGeom prst="rect">
-            <a:avLst/>
-          </a:prstGeom>
-        </p:spPr>
-        <p:txBody>
-          <a:bodyPr wrap="none">
-            <a:spAutoFit/>
-          </a:bodyPr>
-          <a:lstStyle/>
-          <a:p>
-            <a:r>
-              <a:rPr lang="en-US" altLang="zh-CN" dirty="0">
-                <a:solidFill>
-                  <a:schemeClr val="bg1"/>
-                </a:solidFill>
-              </a:rPr>
-              <a:t>payload</a:t>
-            </a:r>
-            <a:r>
-              <a:rPr lang="zh-CN" altLang="en-US" dirty="0">
-                <a:solidFill>
-                  <a:schemeClr val="bg1"/>
-                </a:solidFill>
-              </a:rPr>
-              <a:t>的值是程序员调用这个</a:t>
-            </a:r>
-            <a:r>
-              <a:rPr lang="en-US" altLang="zh-CN" dirty="0">
-                <a:solidFill>
-                  <a:schemeClr val="bg1"/>
-                </a:solidFill>
-              </a:rPr>
-              <a:t>reducer</a:t>
-            </a:r>
-            <a:r>
-              <a:rPr lang="zh-CN" altLang="en-US" dirty="0">
-                <a:solidFill>
-                  <a:schemeClr val="bg1"/>
-                </a:solidFill>
-              </a:rPr>
-              <a:t>时，自己填充的值</a:t>
-            </a:r>
-            <a:endParaRPr lang="en-US" dirty="0">
-              <a:solidFill>
-                <a:schemeClr val="bg1"/>
-              </a:solidFill>
-            </a:endParaRPr>
-          </a:p>
-        </p:txBody>
-      </p:sp>
-      <p:sp>
-        <p:nvSpPr>
-          <p:cNvPr id="15" name="Rectangle 3">
-            <a:extLst>
-              <a:ext uri="{FF2B5EF4-FFF2-40B4-BE49-F238E27FC236}">
-                <a16:creationId xmlns:a16="http://schemas.microsoft.com/office/drawing/2014/main" id="{6BD9C473-75DA-4585-BB98-C08665EADF12}"/>
-              </a:ext>
-            </a:extLst>
-          </p:cNvPr>
-          <p:cNvSpPr/>
-          <p:nvPr/>
-        </p:nvSpPr>
-        <p:spPr>
-          <a:xfrm rot="10800000">
-            <a:off x="2787090" y="4736538"/>
-            <a:ext cx="45719" cy="457200"/>
-          </a:xfrm>
-          <a:prstGeom prst="rect">
-            <a:avLst/>
-          </a:prstGeom>
-          <a:solidFill>
-            <a:srgbClr val="FFA400"/>
-          </a:solidFill>
-          <a:ln>
-            <a:noFill/>
-          </a:ln>
-        </p:spPr>
-        <p:style>
-          <a:lnRef idx="2">
-            <a:schemeClr val="accent1">
-              <a:shade val="50000"/>
-            </a:schemeClr>
-          </a:lnRef>
-          <a:fillRef idx="1">
-            <a:schemeClr val="accent1"/>
-          </a:fillRef>
-          <a:effectRef idx="0">
-            <a:schemeClr val="accent1"/>
-          </a:effectRef>
-          <a:fontRef idx="minor">
-            <a:schemeClr val="lt1"/>
-          </a:fontRef>
-        </p:style>
-        <p:txBody>
-          <a:bodyPr rtlCol="0" anchor="ctr"/>
-          <a:lstStyle/>
-          <a:p>
-            <a:pPr marL="0" marR="0" lvl="0" indent="0" algn="ctr" defTabSz="914400" rtl="0" eaLnBrk="1" fontAlgn="auto" latinLnBrk="0" hangingPunct="1">
-              <a:lnSpc>
-                <a:spcPct val="100000"/>
-              </a:lnSpc>
-              <a:spcBef>
-                <a:spcPts val="0"/>
-              </a:spcBef>
-              <a:spcAft>
-                <a:spcPts val="0"/>
-              </a:spcAft>
-              <a:buClrTx/>
-              <a:buSzTx/>
-              <a:buFontTx/>
-              <a:buNone/>
-              <a:tabLst/>
-              <a:defRPr/>
-            </a:pPr>
-            <a:endParaRPr kumimoji="0" lang="en-US" sz="1800" b="0" i="0" u="none" strike="noStrike" kern="1200" cap="none" spc="0" normalizeH="0" baseline="0" noProof="0">
-              <a:ln>
-                <a:noFill/>
-              </a:ln>
-              <a:solidFill>
-                <a:prstClr val="white"/>
-              </a:solidFill>
-              <a:effectLst/>
-              <a:uLnTx/>
-              <a:uFillTx/>
-              <a:latin typeface="Calibri" panose="020F0502020204030204"/>
-              <a:ea typeface="+mn-ea"/>
-              <a:cs typeface="+mn-cs"/>
-            </a:endParaRPr>
-          </a:p>
-        </p:txBody>
-      </p:sp>
-      <p:sp>
-        <p:nvSpPr>
-          <p:cNvPr id="4" name="矩形 3">
-            <a:extLst>
-              <a:ext uri="{FF2B5EF4-FFF2-40B4-BE49-F238E27FC236}">
-                <a16:creationId xmlns:a16="http://schemas.microsoft.com/office/drawing/2014/main" id="{9BCF5D67-81FC-49B7-93DA-6AA27839AB9F}"/>
-              </a:ext>
-            </a:extLst>
-          </p:cNvPr>
-          <p:cNvSpPr/>
-          <p:nvPr/>
-        </p:nvSpPr>
-        <p:spPr>
-          <a:xfrm>
-            <a:off x="2832809" y="3821709"/>
-            <a:ext cx="646331" cy="369332"/>
-          </a:xfrm>
-          <a:prstGeom prst="rect">
-            <a:avLst/>
-          </a:prstGeom>
-        </p:spPr>
-        <p:txBody>
-          <a:bodyPr wrap="none">
-            <a:spAutoFit/>
-          </a:bodyPr>
-          <a:lstStyle/>
-          <a:p>
-            <a:r>
-              <a:rPr lang="zh-CN" altLang="en-US" dirty="0">
-                <a:solidFill>
-                  <a:schemeClr val="bg1"/>
-                </a:solidFill>
-              </a:rPr>
-              <a:t>其中</a:t>
-            </a:r>
-            <a:endParaRPr lang="en-US" dirty="0"/>
-          </a:p>
-        </p:txBody>
-      </p:sp>
     </p:spTree>
     <p:extLst>
       <p:ext uri="{BB962C8B-B14F-4D97-AF65-F5344CB8AC3E}">
-        <p14:creationId xmlns:p14="http://schemas.microsoft.com/office/powerpoint/2010/main" val="216562017"/>
+        <p14:creationId xmlns:p14="http://schemas.microsoft.com/office/powerpoint/2010/main" val="3951899454"/>
       </p:ext>
     </p:extLst>
   </p:cSld>
@@ -6552,8 +6608,31 @@
                 <a:ea typeface="等线" panose="02010600030101010101" pitchFamily="2" charset="-122"/>
                 <a:cs typeface="+mn-cs"/>
               </a:rPr>
-              <a:t>Create Effects in the Model</a:t>
-            </a:r>
+              <a:t>Create Reducers</a:t>
+            </a:r>
+            <a:r>
+              <a:rPr lang="en-US" altLang="zh-CN" sz="2400" dirty="0">
+                <a:solidFill>
+                  <a:prstClr val="white"/>
+                </a:solidFill>
+                <a:latin typeface="Calibri" panose="020F0502020204030204"/>
+              </a:rPr>
+              <a:t> in the Model</a:t>
+            </a:r>
+            <a:endParaRPr kumimoji="0" lang="en-US" altLang="zh-CN" sz="2400" b="0" i="0" u="none" strike="noStrike" kern="1200" cap="none" spc="0" normalizeH="0" baseline="0" noProof="0" dirty="0">
+              <a:ln>
+                <a:noFill/>
+              </a:ln>
+              <a:solidFill>
+                <a:prstClr val="white"/>
+              </a:solidFill>
+              <a:effectLst/>
+              <a:uLnTx/>
+              <a:uFillTx/>
+              <a:latin typeface="Calibri" panose="020F0502020204030204"/>
+              <a:ea typeface="等线" panose="02010600030101010101" pitchFamily="2" charset="-122"/>
+              <a:cs typeface="+mn-cs"/>
+            </a:endParaRPr>
           </a:p>
         </p:txBody>
       </p:sp>
@@ -6595,10 +6674,10 @@
       </p:pic>
       <p:sp>
         <p:nvSpPr>
-          <p:cNvPr id="2" name="矩形 1">
-            <a:extLst>
-              <a:ext uri="{FF2B5EF4-FFF2-40B4-BE49-F238E27FC236}">
-                <a16:creationId xmlns:a16="http://schemas.microsoft.com/office/drawing/2014/main" id="{1FC962CE-5082-4F55-B45C-A53823A22B08}"/>
+          <p:cNvPr id="3" name="矩形 2">
+            <a:extLst>
+              <a:ext uri="{FF2B5EF4-FFF2-40B4-BE49-F238E27FC236}">
+                <a16:creationId xmlns:a16="http://schemas.microsoft.com/office/drawing/2014/main" id="{72FC8815-CAE3-4D1B-A137-03270E75D742}"/>
               </a:ext>
             </a:extLst>
           </p:cNvPr>
@@ -6607,8 +6686,8 @@
         </p:nvSpPr>
         <p:spPr>
           <a:xfrm>
-            <a:off x="2787091" y="654048"/>
-            <a:ext cx="6096000" cy="3293209"/>
+            <a:off x="2787090" y="1590500"/>
+            <a:ext cx="6096000" cy="2062103"/>
           </a:xfrm>
           <a:prstGeom prst="rect">
             <a:avLst/>
@@ -6860,188 +6939,21 @@
             <a:r>
               <a:rPr lang="en-US" sz="1600" dirty="0">
                 <a:solidFill>
-                  <a:srgbClr val="DCDCAA"/>
-                </a:solidFill>
-                <a:latin typeface="Consolas" panose="020B0609020204030204" pitchFamily="49" charset="0"/>
-              </a:rPr>
-              <a:t>  effects</a:t>
-            </a:r>
-            <a:r>
-              <a:rPr lang="en-US" sz="1600" dirty="0">
-                <a:solidFill>
-                  <a:srgbClr val="9CDCFE"/>
-                </a:solidFill>
-                <a:latin typeface="Consolas" panose="020B0609020204030204" pitchFamily="49" charset="0"/>
-              </a:rPr>
-              <a:t>:</a:t>
-            </a:r>
-            <a:r>
-              <a:rPr lang="en-US" sz="1600" dirty="0">
-                <a:solidFill>
                   <a:srgbClr val="D4D4D4"/>
                 </a:solidFill>
                 <a:latin typeface="Consolas" panose="020B0609020204030204" pitchFamily="49" charset="0"/>
               </a:rPr>
-              <a:t> (</a:t>
-            </a:r>
-            <a:r>
-              <a:rPr lang="en-US" sz="1600" dirty="0">
-                <a:solidFill>
-                  <a:srgbClr val="9CDCFE"/>
-                </a:solidFill>
-                <a:latin typeface="Consolas" panose="020B0609020204030204" pitchFamily="49" charset="0"/>
-              </a:rPr>
-              <a:t>dispatch</a:t>
-            </a:r>
-            <a:r>
-              <a:rPr lang="en-US" sz="1600" dirty="0">
-                <a:solidFill>
-                  <a:srgbClr val="D4D4D4"/>
-                </a:solidFill>
-                <a:latin typeface="Consolas" panose="020B0609020204030204" pitchFamily="49" charset="0"/>
-              </a:rPr>
-              <a:t>) </a:t>
-            </a:r>
-            <a:r>
-              <a:rPr lang="en-US" sz="1600" dirty="0">
-                <a:solidFill>
-                  <a:srgbClr val="569CD6"/>
-                </a:solidFill>
-                <a:latin typeface="Consolas" panose="020B0609020204030204" pitchFamily="49" charset="0"/>
-              </a:rPr>
-              <a:t>=&gt;</a:t>
-            </a:r>
-            <a:r>
-              <a:rPr lang="en-US" sz="1600" dirty="0">
-                <a:solidFill>
-                  <a:srgbClr val="D4D4D4"/>
-                </a:solidFill>
-                <a:latin typeface="Consolas" panose="020B0609020204030204" pitchFamily="49" charset="0"/>
-              </a:rPr>
-              <a:t> ({</a:t>
-            </a:r>
-          </a:p>
-          <a:p>
-            <a:r>
-              <a:rPr lang="en-US" sz="1600" dirty="0">
-                <a:solidFill>
-                  <a:srgbClr val="DCDCAA"/>
-                </a:solidFill>
-                <a:latin typeface="Consolas" panose="020B0609020204030204" pitchFamily="49" charset="0"/>
-              </a:rPr>
-              <a:t>    create</a:t>
-            </a:r>
-            <a:r>
-              <a:rPr lang="en-US" sz="1600" dirty="0">
-                <a:solidFill>
-                  <a:srgbClr val="D4D4D4"/>
-                </a:solidFill>
-                <a:latin typeface="Consolas" panose="020B0609020204030204" pitchFamily="49" charset="0"/>
-              </a:rPr>
-              <a:t>(</a:t>
-            </a:r>
-            <a:r>
-              <a:rPr lang="en-US" sz="1600" dirty="0">
-                <a:solidFill>
-                  <a:srgbClr val="9CDCFE"/>
-                </a:solidFill>
-                <a:latin typeface="Consolas" panose="020B0609020204030204" pitchFamily="49" charset="0"/>
-              </a:rPr>
-              <a:t>payload</a:t>
-            </a:r>
-            <a:r>
-              <a:rPr lang="en-US" sz="1600" dirty="0">
-                <a:solidFill>
-                  <a:srgbClr val="D4D4D4"/>
-                </a:solidFill>
-                <a:latin typeface="Consolas" panose="020B0609020204030204" pitchFamily="49" charset="0"/>
-              </a:rPr>
-              <a:t>, </a:t>
-            </a:r>
-            <a:r>
-              <a:rPr lang="en-US" sz="1600" dirty="0">
-                <a:solidFill>
-                  <a:srgbClr val="9CDCFE"/>
-                </a:solidFill>
-                <a:latin typeface="Consolas" panose="020B0609020204030204" pitchFamily="49" charset="0"/>
-              </a:rPr>
-              <a:t>state</a:t>
-            </a:r>
-            <a:r>
-              <a:rPr lang="en-US" sz="1600" dirty="0">
-                <a:solidFill>
-                  <a:srgbClr val="D4D4D4"/>
-                </a:solidFill>
-                <a:latin typeface="Consolas" panose="020B0609020204030204" pitchFamily="49" charset="0"/>
-              </a:rPr>
-              <a:t>) {</a:t>
-            </a:r>
-          </a:p>
-          <a:p>
-            <a:r>
-              <a:rPr lang="en-US" sz="1600" dirty="0">
-                <a:solidFill>
-                  <a:srgbClr val="6A9955"/>
-                </a:solidFill>
-                <a:latin typeface="Consolas" panose="020B0609020204030204" pitchFamily="49" charset="0"/>
-              </a:rPr>
-              <a:t>      // networking stuff here</a:t>
-            </a:r>
-            <a:endParaRPr lang="en-US" sz="1600" dirty="0">
-              <a:solidFill>
-                <a:srgbClr val="D4D4D4"/>
-              </a:solidFill>
-              <a:latin typeface="Consolas" panose="020B0609020204030204" pitchFamily="49" charset="0"/>
-            </a:endParaRPr>
-          </a:p>
-          <a:p>
-            <a:r>
-              <a:rPr lang="en-US" sz="1600" dirty="0">
-                <a:solidFill>
-                  <a:srgbClr val="D4D4D4"/>
-                </a:solidFill>
-                <a:latin typeface="Consolas" panose="020B0609020204030204" pitchFamily="49" charset="0"/>
-              </a:rPr>
-              <a:t>    }</a:t>
-            </a:r>
-          </a:p>
-          <a:p>
-            <a:r>
-              <a:rPr lang="en-US" sz="1600" dirty="0">
-                <a:solidFill>
-                  <a:srgbClr val="D4D4D4"/>
-                </a:solidFill>
-                <a:latin typeface="Consolas" panose="020B0609020204030204" pitchFamily="49" charset="0"/>
-              </a:rPr>
-              <a:t>  }),</a:t>
-            </a:r>
-          </a:p>
-          <a:p>
-            <a:r>
-              <a:rPr lang="en-US" sz="1600" dirty="0">
-                <a:solidFill>
-                  <a:srgbClr val="D4D4D4"/>
-                </a:solidFill>
-                <a:latin typeface="Consolas" panose="020B0609020204030204" pitchFamily="49" charset="0"/>
-              </a:rPr>
-              <a:t>};</a:t>
-            </a:r>
-            <a:endParaRPr lang="en-US" sz="1600" b="0" dirty="0">
-              <a:solidFill>
-                <a:srgbClr val="D4D4D4"/>
-              </a:solidFill>
-              <a:effectLst/>
-              <a:latin typeface="Consolas" panose="020B0609020204030204" pitchFamily="49" charset="0"/>
-            </a:endParaRPr>
-          </a:p>
-        </p:txBody>
-      </p:sp>
-      <p:sp>
-        <p:nvSpPr>
-          <p:cNvPr id="16" name="矩形 15">
-            <a:extLst>
-              <a:ext uri="{FF2B5EF4-FFF2-40B4-BE49-F238E27FC236}">
-                <a16:creationId xmlns:a16="http://schemas.microsoft.com/office/drawing/2014/main" id="{16AFEF6A-7534-48AB-B1CD-C1BDF2A56746}"/>
+              <a:t>},</a:t>
+            </a:r>
+          </a:p>
+        </p:txBody>
+      </p:sp>
+      <p:sp>
+        <p:nvSpPr>
+          <p:cNvPr id="9" name="矩形 8">
+            <a:extLst>
+              <a:ext uri="{FF2B5EF4-FFF2-40B4-BE49-F238E27FC236}">
+                <a16:creationId xmlns:a16="http://schemas.microsoft.com/office/drawing/2014/main" id="{BCE22B8E-F1DA-43FD-8978-B2F593528294}"/>
               </a:ext>
             </a:extLst>
           </p:cNvPr>
@@ -7050,15 +6962,15 @@
         </p:nvSpPr>
         <p:spPr>
           <a:xfrm>
-            <a:off x="2832811" y="4526907"/>
-            <a:ext cx="8884384" cy="646331"/>
+            <a:off x="2832809" y="4235118"/>
+            <a:ext cx="7003840" cy="369332"/>
           </a:xfrm>
           <a:prstGeom prst="rect">
             <a:avLst/>
           </a:prstGeom>
         </p:spPr>
         <p:txBody>
-          <a:bodyPr wrap="square">
+          <a:bodyPr wrap="none">
             <a:spAutoFit/>
           </a:bodyPr>
           <a:lstStyle/>
@@ -7069,7 +6981,7 @@
                   <a:schemeClr val="bg1"/>
                 </a:solidFill>
               </a:rPr>
-              <a:t>dispatch</a:t>
+              <a:t>state</a:t>
             </a:r>
             <a:r>
               <a:rPr lang="zh-CN" altLang="en-US" dirty="0">
@@ -7077,7 +6989,7 @@
                   <a:schemeClr val="bg1"/>
                 </a:solidFill>
               </a:rPr>
-              <a:t>为</a:t>
+              <a:t>的值是当前</a:t>
             </a:r>
             <a:r>
               <a:rPr lang="en-US" altLang="zh-CN" dirty="0">
@@ -7085,7 +6997,7 @@
                   <a:schemeClr val="bg1"/>
                 </a:solidFill>
               </a:rPr>
-              <a:t>rematch</a:t>
+              <a:t>redux store</a:t>
             </a:r>
             <a:r>
               <a:rPr lang="zh-CN" altLang="en-US" dirty="0">
@@ -7093,15 +7005,15 @@
                   <a:schemeClr val="bg1"/>
                 </a:solidFill>
               </a:rPr>
-              <a:t>中的</a:t>
-            </a:r>
-            <a:r>
-              <a:rPr lang="en-US" altLang="zh-CN" dirty="0">
+              <a:t>中</a:t>
+            </a:r>
+            <a:r>
+              <a:rPr lang="en-US" altLang="zh-CN" dirty="0" err="1">
                 <a:solidFill>
                   <a:schemeClr val="bg1"/>
                 </a:solidFill>
               </a:rPr>
-              <a:t>dispatch</a:t>
+              <a:t>user_token</a:t>
             </a:r>
             <a:r>
               <a:rPr lang="zh-CN" altLang="en-US" dirty="0">
@@ -7109,39 +7021,7 @@
                   <a:schemeClr val="bg1"/>
                 </a:solidFill>
               </a:rPr>
-              <a:t>对象，它是对</a:t>
-            </a:r>
-            <a:r>
-              <a:rPr lang="en-US" altLang="zh-CN" dirty="0">
-                <a:solidFill>
-                  <a:schemeClr val="bg1"/>
-                </a:solidFill>
-              </a:rPr>
-              <a:t>redux</a:t>
-            </a:r>
-            <a:r>
-              <a:rPr lang="zh-CN" altLang="en-US" dirty="0">
-                <a:solidFill>
-                  <a:schemeClr val="bg1"/>
-                </a:solidFill>
-              </a:rPr>
-              <a:t>的</a:t>
-            </a:r>
-            <a:r>
-              <a:rPr lang="en-US" altLang="zh-CN" dirty="0">
-                <a:solidFill>
-                  <a:schemeClr val="bg1"/>
-                </a:solidFill>
-              </a:rPr>
-              <a:t>dispatch</a:t>
-            </a:r>
-            <a:r>
-              <a:rPr lang="zh-CN" altLang="en-US" dirty="0">
-                <a:solidFill>
-                  <a:schemeClr val="bg1"/>
-                </a:solidFill>
-              </a:rPr>
-              <a:t>方法的再封装，由</a:t>
+              <a:t>的值，由</a:t>
             </a:r>
             <a:r>
               <a:rPr lang="en-US" altLang="zh-CN" dirty="0">
@@ -7169,10 +7049,10 @@
       </p:sp>
       <p:sp>
         <p:nvSpPr>
-          <p:cNvPr id="17" name="Rectangle 3">
-            <a:extLst>
-              <a:ext uri="{FF2B5EF4-FFF2-40B4-BE49-F238E27FC236}">
-                <a16:creationId xmlns:a16="http://schemas.microsoft.com/office/drawing/2014/main" id="{0C988EF2-0004-4DCE-84C5-8AB5C6AEB5EC}"/>
+          <p:cNvPr id="13" name="Rectangle 3">
+            <a:extLst>
+              <a:ext uri="{FF2B5EF4-FFF2-40B4-BE49-F238E27FC236}">
+                <a16:creationId xmlns:a16="http://schemas.microsoft.com/office/drawing/2014/main" id="{9E5DE49E-6804-45C4-8726-9FBF345765F3}"/>
               </a:ext>
             </a:extLst>
           </p:cNvPr>
@@ -7181,7 +7061,7 @@
         </p:nvSpPr>
         <p:spPr>
           <a:xfrm rot="10800000">
-            <a:off x="2787092" y="4482973"/>
+            <a:off x="2787090" y="4191184"/>
             <a:ext cx="45719" cy="457200"/>
           </a:xfrm>
           <a:prstGeom prst="rect">
@@ -7250,10 +7130,10 @@
       </p:sp>
       <p:sp>
         <p:nvSpPr>
-          <p:cNvPr id="18" name="矩形 17">
-            <a:extLst>
-              <a:ext uri="{FF2B5EF4-FFF2-40B4-BE49-F238E27FC236}">
-                <a16:creationId xmlns:a16="http://schemas.microsoft.com/office/drawing/2014/main" id="{A46506E9-315C-49E9-8504-1F9D2B336A34}"/>
+          <p:cNvPr id="14" name="矩形 13">
+            <a:extLst>
+              <a:ext uri="{FF2B5EF4-FFF2-40B4-BE49-F238E27FC236}">
+                <a16:creationId xmlns:a16="http://schemas.microsoft.com/office/drawing/2014/main" id="{A229A1CC-617F-4EAE-9844-21C532C2A229}"/>
               </a:ext>
             </a:extLst>
           </p:cNvPr>
@@ -7262,8 +7142,8 @@
         </p:nvSpPr>
         <p:spPr>
           <a:xfrm>
-            <a:off x="2832811" y="5217172"/>
-            <a:ext cx="7127720" cy="369332"/>
+            <a:off x="2832809" y="4780472"/>
+            <a:ext cx="5808706" cy="369332"/>
           </a:xfrm>
           <a:prstGeom prst="rect">
             <a:avLst/>
@@ -7281,7 +7161,7 @@
                   <a:schemeClr val="bg1"/>
                 </a:solidFill>
               </a:rPr>
-              <a:t>create</a:t>
+              <a:t>payload</a:t>
             </a:r>
             <a:r>
               <a:rPr lang="zh-CN" altLang="en-US" dirty="0">
@@ -7289,7 +7169,7 @@
                   <a:schemeClr val="bg1"/>
                 </a:solidFill>
               </a:rPr>
-              <a:t>函数中的</a:t>
+              <a:t>的值是程序员调用这个</a:t>
             </a:r>
             <a:r>
               <a:rPr lang="en-US" altLang="zh-CN" dirty="0">
@@ -7297,23 +7177,7 @@
                   <a:schemeClr val="bg1"/>
                 </a:solidFill>
               </a:rPr>
-              <a:t>payload</a:t>
-            </a:r>
-            <a:r>
-              <a:rPr lang="zh-CN" altLang="en-US" dirty="0">
-                <a:solidFill>
-                  <a:schemeClr val="bg1"/>
-                </a:solidFill>
-              </a:rPr>
-              <a:t>的值是程序员调用这个</a:t>
-            </a:r>
-            <a:r>
-              <a:rPr lang="en-US" altLang="zh-CN" dirty="0">
-                <a:solidFill>
-                  <a:schemeClr val="bg1"/>
-                </a:solidFill>
-              </a:rPr>
-              <a:t>effect</a:t>
+              <a:t>reducer</a:t>
             </a:r>
             <a:r>
               <a:rPr lang="zh-CN" altLang="en-US" dirty="0">
@@ -7333,10 +7197,10 @@
       </p:sp>
       <p:sp>
         <p:nvSpPr>
-          <p:cNvPr id="19" name="Rectangle 3">
-            <a:extLst>
-              <a:ext uri="{FF2B5EF4-FFF2-40B4-BE49-F238E27FC236}">
-                <a16:creationId xmlns:a16="http://schemas.microsoft.com/office/drawing/2014/main" id="{89E4CA3C-B359-4331-B74A-D958180E8AD2}"/>
+          <p:cNvPr id="15" name="Rectangle 3">
+            <a:extLst>
+              <a:ext uri="{FF2B5EF4-FFF2-40B4-BE49-F238E27FC236}">
+                <a16:creationId xmlns:a16="http://schemas.microsoft.com/office/drawing/2014/main" id="{6BD9C473-75DA-4585-BB98-C08665EADF12}"/>
               </a:ext>
             </a:extLst>
           </p:cNvPr>
@@ -7345,7 +7209,7 @@
         </p:nvSpPr>
         <p:spPr>
           <a:xfrm rot="10800000">
-            <a:off x="2787092" y="5173238"/>
+            <a:off x="2787090" y="4736538"/>
             <a:ext cx="45719" cy="457200"/>
           </a:xfrm>
           <a:prstGeom prst="rect">
@@ -7414,10 +7278,10 @@
       </p:sp>
       <p:sp>
         <p:nvSpPr>
-          <p:cNvPr id="20" name="矩形 19">
-            <a:extLst>
-              <a:ext uri="{FF2B5EF4-FFF2-40B4-BE49-F238E27FC236}">
-                <a16:creationId xmlns:a16="http://schemas.microsoft.com/office/drawing/2014/main" id="{97A74A6F-0AFF-4871-AAC7-BD3F8AD67B72}"/>
+          <p:cNvPr id="4" name="矩形 3">
+            <a:extLst>
+              <a:ext uri="{FF2B5EF4-FFF2-40B4-BE49-F238E27FC236}">
+                <a16:creationId xmlns:a16="http://schemas.microsoft.com/office/drawing/2014/main" id="{9BCF5D67-81FC-49B7-93DA-6AA27839AB9F}"/>
               </a:ext>
             </a:extLst>
           </p:cNvPr>
@@ -7426,7 +7290,7 @@
         </p:nvSpPr>
         <p:spPr>
           <a:xfrm>
-            <a:off x="2832811" y="4113498"/>
+            <a:off x="2832809" y="3821709"/>
             <a:ext cx="646331" cy="369332"/>
           </a:xfrm>
           <a:prstGeom prst="rect">
@@ -7451,190 +7315,10 @@
           </a:p>
         </p:txBody>
       </p:sp>
-      <p:sp>
-        <p:nvSpPr>
-          <p:cNvPr id="21" name="矩形 20">
-            <a:extLst>
-              <a:ext uri="{FF2B5EF4-FFF2-40B4-BE49-F238E27FC236}">
-                <a16:creationId xmlns:a16="http://schemas.microsoft.com/office/drawing/2014/main" id="{4F748FF6-DC14-4814-A63B-F6D524679188}"/>
-              </a:ext>
-            </a:extLst>
-          </p:cNvPr>
-          <p:cNvSpPr/>
-          <p:nvPr/>
-        </p:nvSpPr>
-        <p:spPr>
-          <a:xfrm>
-            <a:off x="2832812" y="5749928"/>
-            <a:ext cx="6773008" cy="369332"/>
-          </a:xfrm>
-          <a:prstGeom prst="rect">
-            <a:avLst/>
-          </a:prstGeom>
-        </p:spPr>
-        <p:txBody>
-          <a:bodyPr wrap="none">
-            <a:spAutoFit/>
-          </a:bodyPr>
-          <a:lstStyle/>
-          <a:p>
-            <a:r>
-              <a:rPr lang="en-US" altLang="zh-CN" dirty="0">
-                <a:solidFill>
-                  <a:schemeClr val="bg1"/>
-                </a:solidFill>
-              </a:rPr>
-              <a:t>state</a:t>
-            </a:r>
-            <a:r>
-              <a:rPr lang="zh-CN" altLang="en-US" dirty="0">
-                <a:solidFill>
-                  <a:schemeClr val="bg1"/>
-                </a:solidFill>
-              </a:rPr>
-              <a:t>的值是当前</a:t>
-            </a:r>
-            <a:r>
-              <a:rPr lang="en-US" altLang="zh-CN" dirty="0">
-                <a:solidFill>
-                  <a:schemeClr val="bg1"/>
-                </a:solidFill>
-              </a:rPr>
-              <a:t>redux store</a:t>
-            </a:r>
-            <a:r>
-              <a:rPr lang="zh-CN" altLang="en-US" dirty="0">
-                <a:solidFill>
-                  <a:schemeClr val="bg1"/>
-                </a:solidFill>
-              </a:rPr>
-              <a:t>中</a:t>
-            </a:r>
-            <a:r>
-              <a:rPr lang="en-US" altLang="zh-CN" dirty="0" err="1">
-                <a:solidFill>
-                  <a:schemeClr val="bg1"/>
-                </a:solidFill>
-              </a:rPr>
-              <a:t>user_token</a:t>
-            </a:r>
-            <a:r>
-              <a:rPr lang="zh-CN" altLang="en-US" dirty="0">
-                <a:solidFill>
-                  <a:schemeClr val="bg1"/>
-                </a:solidFill>
-              </a:rPr>
-              <a:t>的值，由</a:t>
-            </a:r>
-            <a:r>
-              <a:rPr lang="en-US" altLang="zh-CN" dirty="0">
-                <a:solidFill>
-                  <a:schemeClr val="bg1"/>
-                </a:solidFill>
-              </a:rPr>
-              <a:t>rematch</a:t>
-            </a:r>
-            <a:r>
-              <a:rPr lang="zh-CN" altLang="en-US" dirty="0">
-                <a:solidFill>
-                  <a:schemeClr val="bg1"/>
-                </a:solidFill>
-              </a:rPr>
-              <a:t>自动填充</a:t>
-            </a:r>
-            <a:endParaRPr lang="en-US" dirty="0">
-              <a:solidFill>
-                <a:schemeClr val="bg1"/>
-              </a:solidFill>
-            </a:endParaRPr>
-          </a:p>
-        </p:txBody>
-      </p:sp>
-      <p:sp>
-        <p:nvSpPr>
-          <p:cNvPr id="22" name="Rectangle 3">
-            <a:extLst>
-              <a:ext uri="{FF2B5EF4-FFF2-40B4-BE49-F238E27FC236}">
-                <a16:creationId xmlns:a16="http://schemas.microsoft.com/office/drawing/2014/main" id="{858AED10-2C52-4B89-A192-761DD0005FDA}"/>
-              </a:ext>
-            </a:extLst>
-          </p:cNvPr>
-          <p:cNvSpPr/>
-          <p:nvPr/>
-        </p:nvSpPr>
-        <p:spPr>
-          <a:xfrm rot="10800000">
-            <a:off x="2787093" y="5705994"/>
-            <a:ext cx="45719" cy="457200"/>
-          </a:xfrm>
-          <a:prstGeom prst="rect">
-            <a:avLst/>
-          </a:prstGeom>
-          <a:solidFill>
-            <a:srgbClr val="FFA400"/>
-          </a:solidFill>
-          <a:ln>
-            <a:noFill/>
-          </a:ln>
-        </p:spPr>
-        <p:style>
-          <a:lnRef idx="2">
-            <a:schemeClr val="accent1">
-              <a:shade val="50000"/>
-            </a:schemeClr>
-          </a:lnRef>
-          <a:fillRef idx="1">
-            <a:schemeClr val="accent1"/>
-          </a:fillRef>
-          <a:effectRef idx="0">
-            <a:schemeClr val="accent1"/>
-          </a:effectRef>
-          <a:fontRef idx="minor">
-            <a:schemeClr val="lt1"/>
-          </a:fontRef>
-        </p:style>
-        <p:txBody>
-          <a:bodyPr rtlCol="0" anchor="ctr"/>
-          <a:lstStyle/>
-          <a:p>
-            <a:pPr marL="0" marR="0" lvl="0" indent="0" algn="ctr" defTabSz="914400" rtl="0" eaLnBrk="1" fontAlgn="auto" latinLnBrk="0" hangingPunct="1">
-              <a:lnSpc>
-                <a:spcPct val="100000"/>
-              </a:lnSpc>
-              <a:spcBef>
-                <a:spcPts val="0"/>
-              </a:spcBef>
-              <a:spcAft>
-                <a:spcPts val="0"/>
-              </a:spcAft>
-              <a:buClrTx/>
-              <a:buSzTx/>
-              <a:buFontTx/>
-              <a:buNone/>
-              <a:tabLst/>
-              <a:defRPr/>
-            </a:pPr>
-            <a:endParaRPr kumimoji="0" lang="en-US" sz="1800" b="0" i="0" u="none" strike="noStrike" kern="1200" cap="none" spc="0" normalizeH="0" baseline="0" noProof="0">
-              <a:ln>
-                <a:noFill/>
-              </a:ln>
-              <a:solidFill>
-                <a:prstClr val="white"/>
-              </a:solidFill>
-              <a:effectLst/>
-              <a:uLnTx/>
-              <a:uFillTx/>
-              <a:latin typeface="Calibri" panose="020F0502020204030204"/>
-              <a:ea typeface="+mn-ea"/>
-              <a:cs typeface="+mn-cs"/>
-            </a:endParaRPr>
-          </a:p>
-        </p:txBody>
-      </p:sp>
     </p:spTree>
     <p:extLst>
       <p:ext uri="{BB962C8B-B14F-4D97-AF65-F5344CB8AC3E}">
-        <p14:creationId xmlns:p14="http://schemas.microsoft.com/office/powerpoint/2010/main" val="404747300"/>
+        <p14:creationId xmlns:p14="http://schemas.microsoft.com/office/powerpoint/2010/main" val="216562017"/>
       </p:ext>
     </p:extLst>
   </p:cSld>
@@ -7830,7 +7514,7 @@
         <p:spPr>
           <a:xfrm>
             <a:off x="345731" y="2595914"/>
-            <a:ext cx="1776032" cy="830997"/>
+            <a:ext cx="1776032" cy="1200329"/>
           </a:xfrm>
           <a:prstGeom prst="rect">
             <a:avLst/>
@@ -7875,7 +7559,7 @@
                 <a:ea typeface="等线" panose="02010600030101010101" pitchFamily="2" charset="-122"/>
                 <a:cs typeface="+mn-cs"/>
               </a:rPr>
-              <a:t>Wrap the Component</a:t>
+              <a:t>Create Effects in the Model</a:t>
             </a:r>
           </a:p>
         </p:txBody>
@@ -7918,10 +7602,10 @@
       </p:pic>
       <p:sp>
         <p:nvSpPr>
-          <p:cNvPr id="3" name="矩形 2">
-            <a:extLst>
-              <a:ext uri="{FF2B5EF4-FFF2-40B4-BE49-F238E27FC236}">
-                <a16:creationId xmlns:a16="http://schemas.microsoft.com/office/drawing/2014/main" id="{9A2B4BB1-B96B-4B7F-A48A-E3F0952D78F9}"/>
+          <p:cNvPr id="2" name="矩形 1">
+            <a:extLst>
+              <a:ext uri="{FF2B5EF4-FFF2-40B4-BE49-F238E27FC236}">
+                <a16:creationId xmlns:a16="http://schemas.microsoft.com/office/drawing/2014/main" id="{1FC962CE-5082-4F55-B45C-A53823A22B08}"/>
               </a:ext>
             </a:extLst>
           </p:cNvPr>
@@ -7930,15 +7614,15 @@
         </p:nvSpPr>
         <p:spPr>
           <a:xfrm>
-            <a:off x="2787090" y="1474057"/>
-            <a:ext cx="6841724" cy="1815882"/>
+            <a:off x="2787091" y="654048"/>
+            <a:ext cx="6096000" cy="3293209"/>
           </a:xfrm>
           <a:prstGeom prst="rect">
             <a:avLst/>
           </a:prstGeom>
         </p:spPr>
         <p:txBody>
-          <a:bodyPr wrap="square">
+          <a:bodyPr>
             <a:spAutoFit/>
           </a:bodyPr>
           <a:lstStyle/>
@@ -7946,6 +7630,42 @@
             <a:r>
               <a:rPr lang="en-US" sz="1600" dirty="0">
                 <a:solidFill>
+                  <a:schemeClr val="accent6">
+                    <a:lumMod val="75000"/>
+                  </a:schemeClr>
+                </a:solidFill>
+              </a:rPr>
+              <a:t>// In file /models.js</a:t>
+            </a:r>
+            <a:endParaRPr lang="en-US" sz="1600" dirty="0">
+              <a:solidFill>
+                <a:srgbClr val="C586C0"/>
+              </a:solidFill>
+              <a:latin typeface="Consolas" panose="020B0609020204030204" pitchFamily="49" charset="0"/>
+            </a:endParaRPr>
+          </a:p>
+          <a:p>
+            <a:r>
+              <a:rPr lang="en-US" sz="1600" dirty="0">
+                <a:solidFill>
+                  <a:srgbClr val="C586C0"/>
+                </a:solidFill>
+                <a:latin typeface="Consolas" panose="020B0609020204030204" pitchFamily="49" charset="0"/>
+              </a:rPr>
+              <a:t>export</a:t>
+            </a:r>
+            <a:r>
+              <a:rPr lang="en-US" sz="1600" dirty="0">
+                <a:solidFill>
+                  <a:srgbClr val="D4D4D4"/>
+                </a:solidFill>
+                <a:latin typeface="Consolas" panose="020B0609020204030204" pitchFamily="49" charset="0"/>
+              </a:rPr>
+              <a:t> </a:t>
+            </a:r>
+            <a:r>
+              <a:rPr lang="en-US" sz="1600" dirty="0">
+                <a:solidFill>
                   <a:srgbClr val="569CD6"/>
                 </a:solidFill>
                 <a:latin typeface="Consolas" panose="020B0609020204030204" pitchFamily="49" charset="0"/>
@@ -7964,11 +7684,89 @@
             <a:r>
               <a:rPr lang="en-US" sz="1600" dirty="0" err="1">
                 <a:solidFill>
+                  <a:srgbClr val="9CDCFE"/>
+                </a:solidFill>
+                <a:latin typeface="Consolas" panose="020B0609020204030204" pitchFamily="49" charset="0"/>
+              </a:rPr>
+              <a:t>user_token</a:t>
+            </a:r>
+            <a:r>
+              <a:rPr lang="en-US" sz="1600" dirty="0">
+                <a:solidFill>
+                  <a:srgbClr val="D4D4D4"/>
+                </a:solidFill>
+                <a:latin typeface="Consolas" panose="020B0609020204030204" pitchFamily="49" charset="0"/>
+              </a:rPr>
+              <a:t> = {</a:t>
+            </a:r>
+          </a:p>
+          <a:p>
+            <a:r>
+              <a:rPr lang="en-US" sz="1600" dirty="0">
+                <a:solidFill>
+                  <a:srgbClr val="9CDCFE"/>
+                </a:solidFill>
+                <a:latin typeface="Consolas" panose="020B0609020204030204" pitchFamily="49" charset="0"/>
+              </a:rPr>
+              <a:t>  state:</a:t>
+            </a:r>
+            <a:r>
+              <a:rPr lang="en-US" sz="1600" dirty="0">
+                <a:solidFill>
+                  <a:srgbClr val="D4D4D4"/>
+                </a:solidFill>
+                <a:latin typeface="Consolas" panose="020B0609020204030204" pitchFamily="49" charset="0"/>
+              </a:rPr>
+              <a:t> </a:t>
+            </a:r>
+            <a:r>
+              <a:rPr lang="en-US" sz="1600" dirty="0">
+                <a:solidFill>
+                  <a:srgbClr val="569CD6"/>
+                </a:solidFill>
+                <a:latin typeface="Consolas" panose="020B0609020204030204" pitchFamily="49" charset="0"/>
+              </a:rPr>
+              <a:t>null</a:t>
+            </a:r>
+            <a:r>
+              <a:rPr lang="en-US" sz="1600" dirty="0">
+                <a:solidFill>
+                  <a:srgbClr val="D4D4D4"/>
+                </a:solidFill>
+                <a:latin typeface="Consolas" panose="020B0609020204030204" pitchFamily="49" charset="0"/>
+              </a:rPr>
+              <a:t>,</a:t>
+            </a:r>
+          </a:p>
+          <a:p>
+            <a:r>
+              <a:rPr lang="en-US" sz="1600" dirty="0">
+                <a:solidFill>
+                  <a:srgbClr val="9CDCFE"/>
+                </a:solidFill>
+                <a:latin typeface="Consolas" panose="020B0609020204030204" pitchFamily="49" charset="0"/>
+              </a:rPr>
+              <a:t>  reducers:</a:t>
+            </a:r>
+            <a:r>
+              <a:rPr lang="en-US" sz="1600" dirty="0">
+                <a:solidFill>
+                  <a:srgbClr val="D4D4D4"/>
+                </a:solidFill>
+                <a:latin typeface="Consolas" panose="020B0609020204030204" pitchFamily="49" charset="0"/>
+              </a:rPr>
+              <a:t> {</a:t>
+            </a:r>
+          </a:p>
+          <a:p>
+            <a:r>
+              <a:rPr lang="en-US" sz="1600" dirty="0">
+                <a:solidFill>
                   <a:srgbClr val="DCDCAA"/>
                 </a:solidFill>
                 <a:latin typeface="Consolas" panose="020B0609020204030204" pitchFamily="49" charset="0"/>
               </a:rPr>
-              <a:t>mapState</a:t>
+              <a:t>    set</a:t>
             </a:r>
             <a:r>
               <a:rPr lang="en-US" sz="1600" dirty="0">
@@ -7977,7 +7775,7 @@
                 </a:solidFill>
                 <a:latin typeface="Consolas" panose="020B0609020204030204" pitchFamily="49" charset="0"/>
               </a:rPr>
-              <a:t> = </a:t>
+              <a:t>(</a:t>
             </a:r>
             <a:r>
               <a:rPr lang="en-US" sz="1600" dirty="0">
@@ -7995,11 +7793,125 @@
                 </a:solidFill>
                 <a:latin typeface="Consolas" panose="020B0609020204030204" pitchFamily="49" charset="0"/>
               </a:rPr>
+              <a:t>, </a:t>
+            </a:r>
+            <a:r>
+              <a:rPr lang="en-US" sz="1600" dirty="0">
+                <a:solidFill>
+                  <a:srgbClr val="9CDCFE"/>
+                </a:solidFill>
+                <a:latin typeface="Consolas" panose="020B0609020204030204" pitchFamily="49" charset="0"/>
+              </a:rPr>
+              <a:t>payload</a:t>
+            </a:r>
+            <a:r>
+              <a:rPr lang="en-US" sz="1600" dirty="0">
+                <a:solidFill>
+                  <a:srgbClr val="D4D4D4"/>
+                </a:solidFill>
+                <a:latin typeface="Consolas" panose="020B0609020204030204" pitchFamily="49" charset="0"/>
+              </a:rPr>
+              <a:t>) {</a:t>
+            </a:r>
+          </a:p>
+          <a:p>
+            <a:r>
+              <a:rPr lang="en-US" sz="1600" dirty="0">
+                <a:solidFill>
+                  <a:srgbClr val="C586C0"/>
+                </a:solidFill>
+                <a:latin typeface="Consolas" panose="020B0609020204030204" pitchFamily="49" charset="0"/>
+              </a:rPr>
+              <a:t>      return</a:t>
+            </a:r>
+            <a:r>
+              <a:rPr lang="en-US" sz="1600" dirty="0">
+                <a:solidFill>
+                  <a:srgbClr val="D4D4D4"/>
+                </a:solidFill>
+                <a:latin typeface="Consolas" panose="020B0609020204030204" pitchFamily="49" charset="0"/>
+              </a:rPr>
               <a:t> </a:t>
             </a:r>
             <a:r>
               <a:rPr lang="en-US" sz="1600" dirty="0">
                 <a:solidFill>
+                  <a:srgbClr val="9CDCFE"/>
+                </a:solidFill>
+                <a:latin typeface="Consolas" panose="020B0609020204030204" pitchFamily="49" charset="0"/>
+              </a:rPr>
+              <a:t>payload</a:t>
+            </a:r>
+            <a:r>
+              <a:rPr lang="en-US" sz="1600" dirty="0">
+                <a:solidFill>
+                  <a:srgbClr val="D4D4D4"/>
+                </a:solidFill>
+                <a:latin typeface="Consolas" panose="020B0609020204030204" pitchFamily="49" charset="0"/>
+              </a:rPr>
+              <a:t>;</a:t>
+            </a:r>
+          </a:p>
+          <a:p>
+            <a:r>
+              <a:rPr lang="en-US" sz="1600" dirty="0">
+                <a:solidFill>
+                  <a:srgbClr val="D4D4D4"/>
+                </a:solidFill>
+                <a:latin typeface="Consolas" panose="020B0609020204030204" pitchFamily="49" charset="0"/>
+              </a:rPr>
+              <a:t>  }</a:t>
+            </a:r>
+          </a:p>
+          <a:p>
+            <a:r>
+              <a:rPr lang="en-US" sz="1600" dirty="0">
+                <a:solidFill>
+                  <a:srgbClr val="DCDCAA"/>
+                </a:solidFill>
+                <a:latin typeface="Consolas" panose="020B0609020204030204" pitchFamily="49" charset="0"/>
+              </a:rPr>
+              <a:t>  effects</a:t>
+            </a:r>
+            <a:r>
+              <a:rPr lang="en-US" sz="1600" dirty="0">
+                <a:solidFill>
+                  <a:srgbClr val="9CDCFE"/>
+                </a:solidFill>
+                <a:latin typeface="Consolas" panose="020B0609020204030204" pitchFamily="49" charset="0"/>
+              </a:rPr>
+              <a:t>:</a:t>
+            </a:r>
+            <a:r>
+              <a:rPr lang="en-US" sz="1600" dirty="0">
+                <a:solidFill>
+                  <a:srgbClr val="D4D4D4"/>
+                </a:solidFill>
+                <a:latin typeface="Consolas" panose="020B0609020204030204" pitchFamily="49" charset="0"/>
+              </a:rPr>
+              <a:t> (</a:t>
+            </a:r>
+            <a:r>
+              <a:rPr lang="en-US" sz="1600" dirty="0">
+                <a:solidFill>
+                  <a:srgbClr val="9CDCFE"/>
+                </a:solidFill>
+                <a:latin typeface="Consolas" panose="020B0609020204030204" pitchFamily="49" charset="0"/>
+              </a:rPr>
+              <a:t>dispatch</a:t>
+            </a:r>
+            <a:r>
+              <a:rPr lang="en-US" sz="1600" dirty="0">
+                <a:solidFill>
+                  <a:srgbClr val="D4D4D4"/>
+                </a:solidFill>
+                <a:latin typeface="Consolas" panose="020B0609020204030204" pitchFamily="49" charset="0"/>
+              </a:rPr>
+              <a:t>) </a:t>
+            </a:r>
+            <a:r>
+              <a:rPr lang="en-US" sz="1600" dirty="0">
+                <a:solidFill>
                   <a:srgbClr val="569CD6"/>
                 </a:solidFill>
                 <a:latin typeface="Consolas" panose="020B0609020204030204" pitchFamily="49" charset="0"/>
@@ -8020,11 +7932,29 @@
             <a:r>
               <a:rPr lang="en-US" sz="1600" dirty="0">
                 <a:solidFill>
+                  <a:srgbClr val="DCDCAA"/>
+                </a:solidFill>
+                <a:latin typeface="Consolas" panose="020B0609020204030204" pitchFamily="49" charset="0"/>
+              </a:rPr>
+              <a:t>    create</a:t>
+            </a:r>
+            <a:r>
+              <a:rPr lang="en-US" sz="1600" dirty="0">
+                <a:solidFill>
+                  <a:srgbClr val="D4D4D4"/>
+                </a:solidFill>
+                <a:latin typeface="Consolas" panose="020B0609020204030204" pitchFamily="49" charset="0"/>
+              </a:rPr>
+              <a:t>(</a:t>
+            </a:r>
+            <a:r>
+              <a:rPr lang="en-US" sz="1600" dirty="0">
+                <a:solidFill>
                   <a:srgbClr val="9CDCFE"/>
                 </a:solidFill>
                 <a:latin typeface="Consolas" panose="020B0609020204030204" pitchFamily="49" charset="0"/>
               </a:rPr>
-              <a:t>  questions:</a:t>
+              <a:t>payload</a:t>
             </a:r>
             <a:r>
               <a:rPr lang="en-US" sz="1600" dirty="0">
@@ -8033,10 +7963,10 @@
                 </a:solidFill>
                 <a:latin typeface="Consolas" panose="020B0609020204030204" pitchFamily="49" charset="0"/>
               </a:rPr>
-              <a:t> </a:t>
-            </a:r>
-            <a:r>
-              <a:rPr lang="en-US" sz="1600" err="1">
+              <a:t>, </a:t>
+            </a:r>
+            <a:r>
+              <a:rPr lang="en-US" sz="1600" dirty="0">
                 <a:solidFill>
                   <a:srgbClr val="9CDCFE"/>
                 </a:solidFill>
@@ -8045,31 +7975,24 @@
               <a:t>state</a:t>
             </a:r>
             <a:r>
-              <a:rPr lang="en-US" sz="1600">
+              <a:rPr lang="en-US" sz="1600" dirty="0">
                 <a:solidFill>
                   <a:srgbClr val="D4D4D4"/>
                 </a:solidFill>
                 <a:latin typeface="Consolas" panose="020B0609020204030204" pitchFamily="49" charset="0"/>
               </a:rPr>
-              <a:t>.</a:t>
-            </a:r>
-            <a:r>
-              <a:rPr lang="en-US" sz="1600">
-                <a:solidFill>
-                  <a:srgbClr val="9CDCFE"/>
-                </a:solidFill>
-                <a:latin typeface="Consolas" panose="020B0609020204030204" pitchFamily="49" charset="0"/>
-              </a:rPr>
-              <a:t>questions</a:t>
-            </a:r>
-            <a:r>
-              <a:rPr lang="en-US" sz="1600">
-                <a:solidFill>
-                  <a:srgbClr val="D4D4D4"/>
-                </a:solidFill>
-                <a:latin typeface="Consolas" panose="020B0609020204030204" pitchFamily="49" charset="0"/>
-              </a:rPr>
-              <a:t>,</a:t>
+              <a:t>) {</a:t>
+            </a:r>
+          </a:p>
+          <a:p>
+            <a:r>
+              <a:rPr lang="en-US" sz="1600" dirty="0">
+                <a:solidFill>
+                  <a:srgbClr val="6A9955"/>
+                </a:solidFill>
+                <a:latin typeface="Consolas" panose="020B0609020204030204" pitchFamily="49" charset="0"/>
+              </a:rPr>
+              <a:t>      // networking stuff here</a:t>
             </a:r>
             <a:endParaRPr lang="en-US" sz="1600" dirty="0">
               <a:solidFill>
@@ -8086,19 +8009,10 @@
                 </a:solidFill>
                 <a:latin typeface="Consolas" panose="020B0609020204030204" pitchFamily="49" charset="0"/>
               </a:rPr>
-              <a:t>});</a:t>
-            </a:r>
-          </a:p>
-          <a:p>
-            <a:r>
-              <a:rPr lang="en-US" sz="1600" dirty="0">
-                <a:solidFill>
-                  <a:srgbClr val="569CD6"/>
-                </a:solidFill>
-                <a:latin typeface="Consolas" panose="020B0609020204030204" pitchFamily="49" charset="0"/>
-              </a:rPr>
-              <a:t>const</a:t>
-            </a:r>
+              <a:t>    }</a:t>
+            </a:r>
+          </a:p>
+          <a:p>
             <a:r>
               <a:rPr lang="en-US" sz="1600" dirty="0">
                 <a:solidFill>
@@ -8106,17 +8020,10 @@
                 </a:solidFill>
                 <a:latin typeface="Consolas" panose="020B0609020204030204" pitchFamily="49" charset="0"/>
               </a:rPr>
-              <a:t> </a:t>
-            </a:r>
-            <a:r>
-              <a:rPr lang="en-US" sz="1600" dirty="0" err="1">
-                <a:solidFill>
-                  <a:srgbClr val="DCDCAA"/>
-                </a:solidFill>
-                <a:latin typeface="Consolas" panose="020B0609020204030204" pitchFamily="49" charset="0"/>
-              </a:rPr>
-              <a:t>mapDispatch</a:t>
-            </a:r>
+              <a:t>  }),</a:t>
+            </a:r>
+          </a:p>
+          <a:p>
             <a:r>
               <a:rPr lang="en-US" sz="1600" dirty="0">
                 <a:solidFill>
@@ -8124,319 +8031,7 @@
                 </a:solidFill>
                 <a:latin typeface="Consolas" panose="020B0609020204030204" pitchFamily="49" charset="0"/>
               </a:rPr>
-              <a:t> = ({ </a:t>
-            </a:r>
-            <a:r>
-              <a:rPr lang="en-US" sz="1600" dirty="0">
-                <a:solidFill>
-                  <a:srgbClr val="9CDCFE"/>
-                </a:solidFill>
-                <a:latin typeface="Consolas" panose="020B0609020204030204" pitchFamily="49" charset="0"/>
-              </a:rPr>
-              <a:t>users</a:t>
-            </a:r>
-            <a:r>
-              <a:rPr lang="en-US" sz="1600" dirty="0">
-                <a:solidFill>
-                  <a:srgbClr val="D4D4D4"/>
-                </a:solidFill>
-                <a:latin typeface="Consolas" panose="020B0609020204030204" pitchFamily="49" charset="0"/>
-              </a:rPr>
-              <a:t>: { </a:t>
-            </a:r>
-            <a:r>
-              <a:rPr lang="en-US" sz="1600" dirty="0">
-                <a:solidFill>
-                  <a:srgbClr val="9CDCFE"/>
-                </a:solidFill>
-                <a:latin typeface="Consolas" panose="020B0609020204030204" pitchFamily="49" charset="0"/>
-              </a:rPr>
-              <a:t>create</a:t>
-            </a:r>
-            <a:r>
-              <a:rPr lang="en-US" sz="1600" dirty="0">
-                <a:solidFill>
-                  <a:srgbClr val="D4D4D4"/>
-                </a:solidFill>
-                <a:latin typeface="Consolas" panose="020B0609020204030204" pitchFamily="49" charset="0"/>
-              </a:rPr>
-              <a:t> } }) </a:t>
-            </a:r>
-            <a:r>
-              <a:rPr lang="en-US" sz="1600" dirty="0">
-                <a:solidFill>
-                  <a:srgbClr val="569CD6"/>
-                </a:solidFill>
-                <a:latin typeface="Consolas" panose="020B0609020204030204" pitchFamily="49" charset="0"/>
-              </a:rPr>
-              <a:t>=&gt;</a:t>
-            </a:r>
-            <a:r>
-              <a:rPr lang="en-US" sz="1600" dirty="0">
-                <a:solidFill>
-                  <a:srgbClr val="D4D4D4"/>
-                </a:solidFill>
-                <a:latin typeface="Consolas" panose="020B0609020204030204" pitchFamily="49" charset="0"/>
-              </a:rPr>
-              <a:t> ({</a:t>
-            </a:r>
-          </a:p>
-          <a:p>
-            <a:r>
-              <a:rPr lang="en-US" sz="1600" dirty="0">
-                <a:solidFill>
-                  <a:srgbClr val="DCDCAA"/>
-                </a:solidFill>
-                <a:latin typeface="Consolas" panose="020B0609020204030204" pitchFamily="49" charset="0"/>
-              </a:rPr>
-              <a:t>  submit</a:t>
-            </a:r>
-            <a:r>
-              <a:rPr lang="en-US" sz="1600" dirty="0">
-                <a:solidFill>
-                  <a:srgbClr val="9CDCFE"/>
-                </a:solidFill>
-                <a:latin typeface="Consolas" panose="020B0609020204030204" pitchFamily="49" charset="0"/>
-              </a:rPr>
-              <a:t>:</a:t>
-            </a:r>
-            <a:r>
-              <a:rPr lang="en-US" sz="1600" dirty="0">
-                <a:solidFill>
-                  <a:srgbClr val="D4D4D4"/>
-                </a:solidFill>
-                <a:latin typeface="Consolas" panose="020B0609020204030204" pitchFamily="49" charset="0"/>
-              </a:rPr>
-              <a:t> (</a:t>
-            </a:r>
-            <a:r>
-              <a:rPr lang="en-US" sz="1600" dirty="0">
-                <a:solidFill>
-                  <a:srgbClr val="9CDCFE"/>
-                </a:solidFill>
-                <a:latin typeface="Consolas" panose="020B0609020204030204" pitchFamily="49" charset="0"/>
-              </a:rPr>
-              <a:t>title</a:t>
-            </a:r>
-            <a:r>
-              <a:rPr lang="en-US" sz="1600" dirty="0">
-                <a:solidFill>
-                  <a:srgbClr val="D4D4D4"/>
-                </a:solidFill>
-                <a:latin typeface="Consolas" panose="020B0609020204030204" pitchFamily="49" charset="0"/>
-              </a:rPr>
-              <a:t>, </a:t>
-            </a:r>
-            <a:r>
-              <a:rPr lang="en-US" sz="1600" dirty="0">
-                <a:solidFill>
-                  <a:srgbClr val="9CDCFE"/>
-                </a:solidFill>
-                <a:latin typeface="Consolas" panose="020B0609020204030204" pitchFamily="49" charset="0"/>
-              </a:rPr>
-              <a:t>content</a:t>
-            </a:r>
-            <a:r>
-              <a:rPr lang="en-US" sz="1600" dirty="0">
-                <a:solidFill>
-                  <a:srgbClr val="D4D4D4"/>
-                </a:solidFill>
-                <a:latin typeface="Consolas" panose="020B0609020204030204" pitchFamily="49" charset="0"/>
-              </a:rPr>
-              <a:t>) </a:t>
-            </a:r>
-            <a:r>
-              <a:rPr lang="en-US" sz="1600" dirty="0">
-                <a:solidFill>
-                  <a:srgbClr val="569CD6"/>
-                </a:solidFill>
-                <a:latin typeface="Consolas" panose="020B0609020204030204" pitchFamily="49" charset="0"/>
-              </a:rPr>
-              <a:t>=&gt;</a:t>
-            </a:r>
-            <a:r>
-              <a:rPr lang="en-US" sz="1600" dirty="0">
-                <a:solidFill>
-                  <a:srgbClr val="D4D4D4"/>
-                </a:solidFill>
-                <a:latin typeface="Consolas" panose="020B0609020204030204" pitchFamily="49" charset="0"/>
-              </a:rPr>
-              <a:t> </a:t>
-            </a:r>
-            <a:r>
-              <a:rPr lang="en-US" sz="1600" dirty="0">
-                <a:solidFill>
-                  <a:srgbClr val="DCDCAA"/>
-                </a:solidFill>
-                <a:latin typeface="Consolas" panose="020B0609020204030204" pitchFamily="49" charset="0"/>
-              </a:rPr>
-              <a:t>create</a:t>
-            </a:r>
-            <a:r>
-              <a:rPr lang="en-US" sz="1600" dirty="0">
-                <a:solidFill>
-                  <a:srgbClr val="D4D4D4"/>
-                </a:solidFill>
-                <a:latin typeface="Consolas" panose="020B0609020204030204" pitchFamily="49" charset="0"/>
-              </a:rPr>
-              <a:t>({ </a:t>
-            </a:r>
-            <a:r>
-              <a:rPr lang="en-US" sz="1600" dirty="0">
-                <a:solidFill>
-                  <a:srgbClr val="9CDCFE"/>
-                </a:solidFill>
-                <a:latin typeface="Consolas" panose="020B0609020204030204" pitchFamily="49" charset="0"/>
-              </a:rPr>
-              <a:t>title</a:t>
-            </a:r>
-            <a:r>
-              <a:rPr lang="en-US" sz="1600" dirty="0">
-                <a:solidFill>
-                  <a:srgbClr val="D4D4D4"/>
-                </a:solidFill>
-                <a:latin typeface="Consolas" panose="020B0609020204030204" pitchFamily="49" charset="0"/>
-              </a:rPr>
-              <a:t>, </a:t>
-            </a:r>
-            <a:r>
-              <a:rPr lang="en-US" sz="1600" dirty="0">
-                <a:solidFill>
-                  <a:srgbClr val="9CDCFE"/>
-                </a:solidFill>
-                <a:latin typeface="Consolas" panose="020B0609020204030204" pitchFamily="49" charset="0"/>
-              </a:rPr>
-              <a:t>content</a:t>
-            </a:r>
-            <a:r>
-              <a:rPr lang="en-US" sz="1600" dirty="0">
-                <a:solidFill>
-                  <a:srgbClr val="D4D4D4"/>
-                </a:solidFill>
-                <a:latin typeface="Consolas" panose="020B0609020204030204" pitchFamily="49" charset="0"/>
-              </a:rPr>
-              <a:t> }),</a:t>
-            </a:r>
-          </a:p>
-          <a:p>
-            <a:r>
-              <a:rPr lang="en-US" sz="1600" dirty="0">
-                <a:solidFill>
-                  <a:srgbClr val="D4D4D4"/>
-                </a:solidFill>
-                <a:latin typeface="Consolas" panose="020B0609020204030204" pitchFamily="49" charset="0"/>
-              </a:rPr>
-              <a:t>});</a:t>
-            </a:r>
-          </a:p>
-          <a:p>
-            <a:r>
-              <a:rPr lang="en-US" sz="1600" dirty="0">
-                <a:solidFill>
-                  <a:srgbClr val="C586C0"/>
-                </a:solidFill>
-                <a:latin typeface="Consolas" panose="020B0609020204030204" pitchFamily="49" charset="0"/>
-              </a:rPr>
-              <a:t>export</a:t>
-            </a:r>
-            <a:r>
-              <a:rPr lang="en-US" sz="1600" dirty="0">
-                <a:solidFill>
-                  <a:srgbClr val="D4D4D4"/>
-                </a:solidFill>
-                <a:latin typeface="Consolas" panose="020B0609020204030204" pitchFamily="49" charset="0"/>
-              </a:rPr>
-              <a:t> </a:t>
-            </a:r>
-            <a:r>
-              <a:rPr lang="en-US" sz="1600" dirty="0">
-                <a:solidFill>
-                  <a:srgbClr val="C586C0"/>
-                </a:solidFill>
-                <a:latin typeface="Consolas" panose="020B0609020204030204" pitchFamily="49" charset="0"/>
-              </a:rPr>
-              <a:t>default</a:t>
-            </a:r>
-            <a:r>
-              <a:rPr lang="en-US" sz="1600" dirty="0">
-                <a:solidFill>
-                  <a:srgbClr val="D4D4D4"/>
-                </a:solidFill>
-                <a:latin typeface="Consolas" panose="020B0609020204030204" pitchFamily="49" charset="0"/>
-              </a:rPr>
-              <a:t> </a:t>
-            </a:r>
-            <a:r>
-              <a:rPr lang="en-US" sz="1600" dirty="0">
-                <a:solidFill>
-                  <a:srgbClr val="DCDCAA"/>
-                </a:solidFill>
-                <a:latin typeface="Consolas" panose="020B0609020204030204" pitchFamily="49" charset="0"/>
-              </a:rPr>
-              <a:t>connect</a:t>
-            </a:r>
-            <a:r>
-              <a:rPr lang="en-US" sz="1600" dirty="0">
-                <a:solidFill>
-                  <a:srgbClr val="D4D4D4"/>
-                </a:solidFill>
-                <a:latin typeface="Consolas" panose="020B0609020204030204" pitchFamily="49" charset="0"/>
-              </a:rPr>
-              <a:t>(</a:t>
-            </a:r>
-            <a:r>
-              <a:rPr lang="en-US" sz="1600" dirty="0" err="1">
-                <a:solidFill>
-                  <a:srgbClr val="9CDCFE"/>
-                </a:solidFill>
-                <a:latin typeface="Consolas" panose="020B0609020204030204" pitchFamily="49" charset="0"/>
-              </a:rPr>
-              <a:t>mapState</a:t>
-            </a:r>
-            <a:r>
-              <a:rPr lang="en-US" sz="1600" dirty="0">
-                <a:solidFill>
-                  <a:srgbClr val="D4D4D4"/>
-                </a:solidFill>
-                <a:latin typeface="Consolas" panose="020B0609020204030204" pitchFamily="49" charset="0"/>
-              </a:rPr>
-              <a:t>, </a:t>
-            </a:r>
-            <a:r>
-              <a:rPr lang="en-US" sz="1600" dirty="0" err="1">
-                <a:solidFill>
-                  <a:srgbClr val="9CDCFE"/>
-                </a:solidFill>
-                <a:latin typeface="Consolas" panose="020B0609020204030204" pitchFamily="49" charset="0"/>
-              </a:rPr>
-              <a:t>mapDispatch</a:t>
-            </a:r>
-            <a:r>
-              <a:rPr lang="en-US" sz="1600" dirty="0">
-                <a:solidFill>
-                  <a:srgbClr val="D4D4D4"/>
-                </a:solidFill>
-                <a:latin typeface="Consolas" panose="020B0609020204030204" pitchFamily="49" charset="0"/>
-              </a:rPr>
-              <a:t>)(</a:t>
-            </a:r>
-            <a:r>
-              <a:rPr lang="en-US" sz="1600" dirty="0">
-                <a:solidFill>
-                  <a:srgbClr val="9CDCFE"/>
-                </a:solidFill>
-                <a:latin typeface="Consolas" panose="020B0609020204030204" pitchFamily="49" charset="0"/>
-              </a:rPr>
-              <a:t>Questions</a:t>
-            </a:r>
-            <a:r>
-              <a:rPr lang="en-US" sz="1600" dirty="0">
-                <a:solidFill>
-                  <a:srgbClr val="D4D4D4"/>
-                </a:solidFill>
-                <a:latin typeface="Consolas" panose="020B0609020204030204" pitchFamily="49" charset="0"/>
-              </a:rPr>
-              <a:t>);</a:t>
+              <a:t>};</a:t>
             </a:r>
             <a:endParaRPr lang="en-US" sz="1600" b="0" dirty="0">
               <a:solidFill>
@@ -8448,6 +8043,886 @@
           </a:p>
         </p:txBody>
       </p:sp>
+      <p:sp>
+        <p:nvSpPr>
+          <p:cNvPr id="16" name="矩形 15">
+            <a:extLst>
+              <a:ext uri="{FF2B5EF4-FFF2-40B4-BE49-F238E27FC236}">
+                <a16:creationId xmlns:a16="http://schemas.microsoft.com/office/drawing/2014/main" id="{16AFEF6A-7534-48AB-B1CD-C1BDF2A56746}"/>
+              </a:ext>
+            </a:extLst>
+          </p:cNvPr>
+          <p:cNvSpPr/>
+          <p:nvPr/>
+        </p:nvSpPr>
+        <p:spPr>
+          <a:xfrm>
+            <a:off x="2832811" y="4526907"/>
+            <a:ext cx="8884384" cy="646331"/>
+          </a:xfrm>
+          <a:prstGeom prst="rect">
+            <a:avLst/>
+          </a:prstGeom>
+        </p:spPr>
+        <p:txBody>
+          <a:bodyPr wrap="square">
+            <a:spAutoFit/>
+          </a:bodyPr>
+          <a:lstStyle/>
+          <a:p>
+            <a:r>
+              <a:rPr lang="en-US" altLang="zh-CN" dirty="0">
+                <a:solidFill>
+                  <a:schemeClr val="bg1"/>
+                </a:solidFill>
+              </a:rPr>
+              <a:t>dispatch</a:t>
+            </a:r>
+            <a:r>
+              <a:rPr lang="zh-CN" altLang="en-US" dirty="0">
+                <a:solidFill>
+                  <a:schemeClr val="bg1"/>
+                </a:solidFill>
+              </a:rPr>
+              <a:t>为</a:t>
+            </a:r>
+            <a:r>
+              <a:rPr lang="en-US" altLang="zh-CN" dirty="0">
+                <a:solidFill>
+                  <a:schemeClr val="bg1"/>
+                </a:solidFill>
+              </a:rPr>
+              <a:t>rematch</a:t>
+            </a:r>
+            <a:r>
+              <a:rPr lang="zh-CN" altLang="en-US" dirty="0">
+                <a:solidFill>
+                  <a:schemeClr val="bg1"/>
+                </a:solidFill>
+              </a:rPr>
+              <a:t>中的</a:t>
+            </a:r>
+            <a:r>
+              <a:rPr lang="en-US" altLang="zh-CN" dirty="0">
+                <a:solidFill>
+                  <a:schemeClr val="bg1"/>
+                </a:solidFill>
+              </a:rPr>
+              <a:t>dispatch</a:t>
+            </a:r>
+            <a:r>
+              <a:rPr lang="zh-CN" altLang="en-US" dirty="0">
+                <a:solidFill>
+                  <a:schemeClr val="bg1"/>
+                </a:solidFill>
+              </a:rPr>
+              <a:t>对象，它是对</a:t>
+            </a:r>
+            <a:r>
+              <a:rPr lang="en-US" altLang="zh-CN" dirty="0">
+                <a:solidFill>
+                  <a:schemeClr val="bg1"/>
+                </a:solidFill>
+              </a:rPr>
+              <a:t>redux</a:t>
+            </a:r>
+            <a:r>
+              <a:rPr lang="zh-CN" altLang="en-US" dirty="0">
+                <a:solidFill>
+                  <a:schemeClr val="bg1"/>
+                </a:solidFill>
+              </a:rPr>
+              <a:t>的</a:t>
+            </a:r>
+            <a:r>
+              <a:rPr lang="en-US" altLang="zh-CN" dirty="0">
+                <a:solidFill>
+                  <a:schemeClr val="bg1"/>
+                </a:solidFill>
+              </a:rPr>
+              <a:t>dispatch</a:t>
+            </a:r>
+            <a:r>
+              <a:rPr lang="zh-CN" altLang="en-US" dirty="0">
+                <a:solidFill>
+                  <a:schemeClr val="bg1"/>
+                </a:solidFill>
+              </a:rPr>
+              <a:t>方法的再封装，由</a:t>
+            </a:r>
+            <a:r>
+              <a:rPr lang="en-US" altLang="zh-CN" dirty="0">
+                <a:solidFill>
+                  <a:schemeClr val="bg1"/>
+                </a:solidFill>
+              </a:rPr>
+              <a:t>rematch</a:t>
+            </a:r>
+            <a:r>
+              <a:rPr lang="zh-CN" altLang="en-US" dirty="0">
+                <a:solidFill>
+                  <a:schemeClr val="bg1"/>
+                </a:solidFill>
+              </a:rPr>
+              <a:t>自动填充</a:t>
+            </a:r>
+            <a:endParaRPr lang="en-US" dirty="0">
+              <a:solidFill>
+                <a:schemeClr val="bg1"/>
+              </a:solidFill>
+            </a:endParaRPr>
+          </a:p>
+        </p:txBody>
+      </p:sp>
+      <p:sp>
+        <p:nvSpPr>
+          <p:cNvPr id="17" name="Rectangle 3">
+            <a:extLst>
+              <a:ext uri="{FF2B5EF4-FFF2-40B4-BE49-F238E27FC236}">
+                <a16:creationId xmlns:a16="http://schemas.microsoft.com/office/drawing/2014/main" id="{0C988EF2-0004-4DCE-84C5-8AB5C6AEB5EC}"/>
+              </a:ext>
+            </a:extLst>
+          </p:cNvPr>
+          <p:cNvSpPr/>
+          <p:nvPr/>
+        </p:nvSpPr>
+        <p:spPr>
+          <a:xfrm rot="10800000">
+            <a:off x="2787092" y="4482973"/>
+            <a:ext cx="45719" cy="457200"/>
+          </a:xfrm>
+          <a:prstGeom prst="rect">
+            <a:avLst/>
+          </a:prstGeom>
+          <a:solidFill>
+            <a:srgbClr val="FFA400"/>
+          </a:solidFill>
+          <a:ln>
+            <a:noFill/>
+          </a:ln>
+        </p:spPr>
+        <p:style>
+          <a:lnRef idx="2">
+            <a:schemeClr val="accent1">
+              <a:shade val="50000"/>
+            </a:schemeClr>
+          </a:lnRef>
+          <a:fillRef idx="1">
+            <a:schemeClr val="accent1"/>
+          </a:fillRef>
+          <a:effectRef idx="0">
+            <a:schemeClr val="accent1"/>
+          </a:effectRef>
+          <a:fontRef idx="minor">
+            <a:schemeClr val="lt1"/>
+          </a:fontRef>
+        </p:style>
+        <p:txBody>
+          <a:bodyPr rtlCol="0" anchor="ctr"/>
+          <a:lstStyle/>
+          <a:p>
+            <a:pPr marL="0" marR="0" lvl="0" indent="0" algn="ctr" defTabSz="914400" rtl="0" eaLnBrk="1" fontAlgn="auto" latinLnBrk="0" hangingPunct="1">
+              <a:lnSpc>
+                <a:spcPct val="100000"/>
+              </a:lnSpc>
+              <a:spcBef>
+                <a:spcPts val="0"/>
+              </a:spcBef>
+              <a:spcAft>
+                <a:spcPts val="0"/>
+              </a:spcAft>
+              <a:buClrTx/>
+              <a:buSzTx/>
+              <a:buFontTx/>
+              <a:buNone/>
+              <a:tabLst/>
+              <a:defRPr/>
+            </a:pPr>
+            <a:endParaRPr kumimoji="0" lang="en-US" sz="1800" b="0" i="0" u="none" strike="noStrike" kern="1200" cap="none" spc="0" normalizeH="0" baseline="0" noProof="0">
+              <a:ln>
+                <a:noFill/>
+              </a:ln>
+              <a:solidFill>
+                <a:prstClr val="white"/>
+              </a:solidFill>
+              <a:effectLst/>
+              <a:uLnTx/>
+              <a:uFillTx/>
+              <a:latin typeface="Calibri" panose="020F0502020204030204"/>
+              <a:ea typeface="+mn-ea"/>
+              <a:cs typeface="+mn-cs"/>
+            </a:endParaRPr>
+          </a:p>
+        </p:txBody>
+      </p:sp>
+      <p:sp>
+        <p:nvSpPr>
+          <p:cNvPr id="18" name="矩形 17">
+            <a:extLst>
+              <a:ext uri="{FF2B5EF4-FFF2-40B4-BE49-F238E27FC236}">
+                <a16:creationId xmlns:a16="http://schemas.microsoft.com/office/drawing/2014/main" id="{A46506E9-315C-49E9-8504-1F9D2B336A34}"/>
+              </a:ext>
+            </a:extLst>
+          </p:cNvPr>
+          <p:cNvSpPr/>
+          <p:nvPr/>
+        </p:nvSpPr>
+        <p:spPr>
+          <a:xfrm>
+            <a:off x="2832811" y="5217172"/>
+            <a:ext cx="7127720" cy="369332"/>
+          </a:xfrm>
+          <a:prstGeom prst="rect">
+            <a:avLst/>
+          </a:prstGeom>
+        </p:spPr>
+        <p:txBody>
+          <a:bodyPr wrap="none">
+            <a:spAutoFit/>
+          </a:bodyPr>
+          <a:lstStyle/>
+          <a:p>
+            <a:r>
+              <a:rPr lang="en-US" altLang="zh-CN" dirty="0">
+                <a:solidFill>
+                  <a:schemeClr val="bg1"/>
+                </a:solidFill>
+              </a:rPr>
+              <a:t>create</a:t>
+            </a:r>
+            <a:r>
+              <a:rPr lang="zh-CN" altLang="en-US" dirty="0">
+                <a:solidFill>
+                  <a:schemeClr val="bg1"/>
+                </a:solidFill>
+              </a:rPr>
+              <a:t>函数中的</a:t>
+            </a:r>
+            <a:r>
+              <a:rPr lang="en-US" altLang="zh-CN" dirty="0">
+                <a:solidFill>
+                  <a:schemeClr val="bg1"/>
+                </a:solidFill>
+              </a:rPr>
+              <a:t>payload</a:t>
+            </a:r>
+            <a:r>
+              <a:rPr lang="zh-CN" altLang="en-US" dirty="0">
+                <a:solidFill>
+                  <a:schemeClr val="bg1"/>
+                </a:solidFill>
+              </a:rPr>
+              <a:t>的值是程序员调用这个</a:t>
+            </a:r>
+            <a:r>
+              <a:rPr lang="en-US" altLang="zh-CN" dirty="0">
+                <a:solidFill>
+                  <a:schemeClr val="bg1"/>
+                </a:solidFill>
+              </a:rPr>
+              <a:t>effect</a:t>
+            </a:r>
+            <a:r>
+              <a:rPr lang="zh-CN" altLang="en-US" dirty="0">
+                <a:solidFill>
+                  <a:schemeClr val="bg1"/>
+                </a:solidFill>
+              </a:rPr>
+              <a:t>时，自己填充的值</a:t>
+            </a:r>
+            <a:endParaRPr lang="en-US" dirty="0">
+              <a:solidFill>
+                <a:schemeClr val="bg1"/>
+              </a:solidFill>
+            </a:endParaRPr>
+          </a:p>
+        </p:txBody>
+      </p:sp>
+      <p:sp>
+        <p:nvSpPr>
+          <p:cNvPr id="19" name="Rectangle 3">
+            <a:extLst>
+              <a:ext uri="{FF2B5EF4-FFF2-40B4-BE49-F238E27FC236}">
+                <a16:creationId xmlns:a16="http://schemas.microsoft.com/office/drawing/2014/main" id="{89E4CA3C-B359-4331-B74A-D958180E8AD2}"/>
+              </a:ext>
+            </a:extLst>
+          </p:cNvPr>
+          <p:cNvSpPr/>
+          <p:nvPr/>
+        </p:nvSpPr>
+        <p:spPr>
+          <a:xfrm rot="10800000">
+            <a:off x="2787092" y="5173238"/>
+            <a:ext cx="45719" cy="457200"/>
+          </a:xfrm>
+          <a:prstGeom prst="rect">
+            <a:avLst/>
+          </a:prstGeom>
+          <a:solidFill>
+            <a:srgbClr val="FFA400"/>
+          </a:solidFill>
+          <a:ln>
+            <a:noFill/>
+          </a:ln>
+        </p:spPr>
+        <p:style>
+          <a:lnRef idx="2">
+            <a:schemeClr val="accent1">
+              <a:shade val="50000"/>
+            </a:schemeClr>
+          </a:lnRef>
+          <a:fillRef idx="1">
+            <a:schemeClr val="accent1"/>
+          </a:fillRef>
+          <a:effectRef idx="0">
+            <a:schemeClr val="accent1"/>
+          </a:effectRef>
+          <a:fontRef idx="minor">
+            <a:schemeClr val="lt1"/>
+          </a:fontRef>
+        </p:style>
+        <p:txBody>
+          <a:bodyPr rtlCol="0" anchor="ctr"/>
+          <a:lstStyle/>
+          <a:p>
+            <a:pPr marL="0" marR="0" lvl="0" indent="0" algn="ctr" defTabSz="914400" rtl="0" eaLnBrk="1" fontAlgn="auto" latinLnBrk="0" hangingPunct="1">
+              <a:lnSpc>
+                <a:spcPct val="100000"/>
+              </a:lnSpc>
+              <a:spcBef>
+                <a:spcPts val="0"/>
+              </a:spcBef>
+              <a:spcAft>
+                <a:spcPts val="0"/>
+              </a:spcAft>
+              <a:buClrTx/>
+              <a:buSzTx/>
+              <a:buFontTx/>
+              <a:buNone/>
+              <a:tabLst/>
+              <a:defRPr/>
+            </a:pPr>
+            <a:endParaRPr kumimoji="0" lang="en-US" sz="1800" b="0" i="0" u="none" strike="noStrike" kern="1200" cap="none" spc="0" normalizeH="0" baseline="0" noProof="0">
+              <a:ln>
+                <a:noFill/>
+              </a:ln>
+              <a:solidFill>
+                <a:prstClr val="white"/>
+              </a:solidFill>
+              <a:effectLst/>
+              <a:uLnTx/>
+              <a:uFillTx/>
+              <a:latin typeface="Calibri" panose="020F0502020204030204"/>
+              <a:ea typeface="+mn-ea"/>
+              <a:cs typeface="+mn-cs"/>
+            </a:endParaRPr>
+          </a:p>
+        </p:txBody>
+      </p:sp>
+      <p:sp>
+        <p:nvSpPr>
+          <p:cNvPr id="20" name="矩形 19">
+            <a:extLst>
+              <a:ext uri="{FF2B5EF4-FFF2-40B4-BE49-F238E27FC236}">
+                <a16:creationId xmlns:a16="http://schemas.microsoft.com/office/drawing/2014/main" id="{97A74A6F-0AFF-4871-AAC7-BD3F8AD67B72}"/>
+              </a:ext>
+            </a:extLst>
+          </p:cNvPr>
+          <p:cNvSpPr/>
+          <p:nvPr/>
+        </p:nvSpPr>
+        <p:spPr>
+          <a:xfrm>
+            <a:off x="2832811" y="4113498"/>
+            <a:ext cx="646331" cy="369332"/>
+          </a:xfrm>
+          <a:prstGeom prst="rect">
+            <a:avLst/>
+          </a:prstGeom>
+        </p:spPr>
+        <p:txBody>
+          <a:bodyPr wrap="none">
+            <a:spAutoFit/>
+          </a:bodyPr>
+          <a:lstStyle/>
+          <a:p>
+            <a:r>
+              <a:rPr lang="zh-CN" altLang="en-US" dirty="0">
+                <a:solidFill>
+                  <a:schemeClr val="bg1"/>
+                </a:solidFill>
+              </a:rPr>
+              <a:t>其中</a:t>
+            </a:r>
+            <a:endParaRPr lang="en-US" dirty="0"/>
+          </a:p>
+        </p:txBody>
+      </p:sp>
+      <p:sp>
+        <p:nvSpPr>
+          <p:cNvPr id="21" name="矩形 20">
+            <a:extLst>
+              <a:ext uri="{FF2B5EF4-FFF2-40B4-BE49-F238E27FC236}">
+                <a16:creationId xmlns:a16="http://schemas.microsoft.com/office/drawing/2014/main" id="{4F748FF6-DC14-4814-A63B-F6D524679188}"/>
+              </a:ext>
+            </a:extLst>
+          </p:cNvPr>
+          <p:cNvSpPr/>
+          <p:nvPr/>
+        </p:nvSpPr>
+        <p:spPr>
+          <a:xfrm>
+            <a:off x="2832812" y="5749928"/>
+            <a:ext cx="6773008" cy="369332"/>
+          </a:xfrm>
+          <a:prstGeom prst="rect">
+            <a:avLst/>
+          </a:prstGeom>
+        </p:spPr>
+        <p:txBody>
+          <a:bodyPr wrap="none">
+            <a:spAutoFit/>
+          </a:bodyPr>
+          <a:lstStyle/>
+          <a:p>
+            <a:r>
+              <a:rPr lang="en-US" altLang="zh-CN" dirty="0">
+                <a:solidFill>
+                  <a:schemeClr val="bg1"/>
+                </a:solidFill>
+              </a:rPr>
+              <a:t>state</a:t>
+            </a:r>
+            <a:r>
+              <a:rPr lang="zh-CN" altLang="en-US" dirty="0">
+                <a:solidFill>
+                  <a:schemeClr val="bg1"/>
+                </a:solidFill>
+              </a:rPr>
+              <a:t>的值是当前</a:t>
+            </a:r>
+            <a:r>
+              <a:rPr lang="en-US" altLang="zh-CN" dirty="0">
+                <a:solidFill>
+                  <a:schemeClr val="bg1"/>
+                </a:solidFill>
+              </a:rPr>
+              <a:t>redux store</a:t>
+            </a:r>
+            <a:r>
+              <a:rPr lang="zh-CN" altLang="en-US" dirty="0">
+                <a:solidFill>
+                  <a:schemeClr val="bg1"/>
+                </a:solidFill>
+              </a:rPr>
+              <a:t>中</a:t>
+            </a:r>
+            <a:r>
+              <a:rPr lang="en-US" altLang="zh-CN" dirty="0" err="1">
+                <a:solidFill>
+                  <a:schemeClr val="bg1"/>
+                </a:solidFill>
+              </a:rPr>
+              <a:t>user_token</a:t>
+            </a:r>
+            <a:r>
+              <a:rPr lang="zh-CN" altLang="en-US" dirty="0">
+                <a:solidFill>
+                  <a:schemeClr val="bg1"/>
+                </a:solidFill>
+              </a:rPr>
+              <a:t>的值，由</a:t>
+            </a:r>
+            <a:r>
+              <a:rPr lang="en-US" altLang="zh-CN" dirty="0">
+                <a:solidFill>
+                  <a:schemeClr val="bg1"/>
+                </a:solidFill>
+              </a:rPr>
+              <a:t>rematch</a:t>
+            </a:r>
+            <a:r>
+              <a:rPr lang="zh-CN" altLang="en-US" dirty="0">
+                <a:solidFill>
+                  <a:schemeClr val="bg1"/>
+                </a:solidFill>
+              </a:rPr>
+              <a:t>自动填充</a:t>
+            </a:r>
+            <a:endParaRPr lang="en-US" dirty="0">
+              <a:solidFill>
+                <a:schemeClr val="bg1"/>
+              </a:solidFill>
+            </a:endParaRPr>
+          </a:p>
+        </p:txBody>
+      </p:sp>
+      <p:sp>
+        <p:nvSpPr>
+          <p:cNvPr id="22" name="Rectangle 3">
+            <a:extLst>
+              <a:ext uri="{FF2B5EF4-FFF2-40B4-BE49-F238E27FC236}">
+                <a16:creationId xmlns:a16="http://schemas.microsoft.com/office/drawing/2014/main" id="{858AED10-2C52-4B89-A192-761DD0005FDA}"/>
+              </a:ext>
+            </a:extLst>
+          </p:cNvPr>
+          <p:cNvSpPr/>
+          <p:nvPr/>
+        </p:nvSpPr>
+        <p:spPr>
+          <a:xfrm rot="10800000">
+            <a:off x="2787093" y="5705994"/>
+            <a:ext cx="45719" cy="457200"/>
+          </a:xfrm>
+          <a:prstGeom prst="rect">
+            <a:avLst/>
+          </a:prstGeom>
+          <a:solidFill>
+            <a:srgbClr val="FFA400"/>
+          </a:solidFill>
+          <a:ln>
+            <a:noFill/>
+          </a:ln>
+        </p:spPr>
+        <p:style>
+          <a:lnRef idx="2">
+            <a:schemeClr val="accent1">
+              <a:shade val="50000"/>
+            </a:schemeClr>
+          </a:lnRef>
+          <a:fillRef idx="1">
+            <a:schemeClr val="accent1"/>
+          </a:fillRef>
+          <a:effectRef idx="0">
+            <a:schemeClr val="accent1"/>
+          </a:effectRef>
+          <a:fontRef idx="minor">
+            <a:schemeClr val="lt1"/>
+          </a:fontRef>
+        </p:style>
+        <p:txBody>
+          <a:bodyPr rtlCol="0" anchor="ctr"/>
+          <a:lstStyle/>
+          <a:p>
+            <a:pPr marL="0" marR="0" lvl="0" indent="0" algn="ctr" defTabSz="914400" rtl="0" eaLnBrk="1" fontAlgn="auto" latinLnBrk="0" hangingPunct="1">
+              <a:lnSpc>
+                <a:spcPct val="100000"/>
+              </a:lnSpc>
+              <a:spcBef>
+                <a:spcPts val="0"/>
+              </a:spcBef>
+              <a:spcAft>
+                <a:spcPts val="0"/>
+              </a:spcAft>
+              <a:buClrTx/>
+              <a:buSzTx/>
+              <a:buFontTx/>
+              <a:buNone/>
+              <a:tabLst/>
+              <a:defRPr/>
+            </a:pPr>
+            <a:endParaRPr kumimoji="0" lang="en-US" sz="1800" b="0" i="0" u="none" strike="noStrike" kern="1200" cap="none" spc="0" normalizeH="0" baseline="0" noProof="0">
+              <a:ln>
+                <a:noFill/>
+              </a:ln>
+              <a:solidFill>
+                <a:prstClr val="white"/>
+              </a:solidFill>
+              <a:effectLst/>
+              <a:uLnTx/>
+              <a:uFillTx/>
+              <a:latin typeface="Calibri" panose="020F0502020204030204"/>
+              <a:ea typeface="+mn-ea"/>
+              <a:cs typeface="+mn-cs"/>
+            </a:endParaRPr>
+          </a:p>
+        </p:txBody>
+      </p:sp>
+    </p:spTree>
+    <p:extLst>
+      <p:ext uri="{BB962C8B-B14F-4D97-AF65-F5344CB8AC3E}">
+        <p14:creationId xmlns:p14="http://schemas.microsoft.com/office/powerpoint/2010/main" val="404747300"/>
+      </p:ext>
+    </p:extLst>
+  </p:cSld>
+  <p:clrMapOvr>
+    <a:masterClrMapping/>
+  </p:clrMapOvr>
+</p:sld>
+</file>
+
+<file path=ppt/slides/slide7.xml><?xml version="1.0" encoding="utf-8"?>
+<p:sld xmlns:a="http://schemas.openxmlformats.org/drawingml/2006/main" xmlns:r="http://schemas.openxmlformats.org/officeDocument/2006/relationships" xmlns:p="http://schemas.openxmlformats.org/presentationml/2006/main">
+  <p:cSld>
+    <p:bg>
+      <p:bgPr>
+        <a:solidFill>
+          <a:srgbClr val="181720"/>
+        </a:solidFill>
+        <a:effectLst/>
+      </p:bgPr>
+    </p:bg>
+    <p:spTree>
+      <p:nvGrpSpPr>
+        <p:cNvPr id="1" name=""/>
+        <p:cNvGrpSpPr/>
+        <p:nvPr/>
+      </p:nvGrpSpPr>
+      <p:grpSpPr>
+        <a:xfrm>
+          <a:off x="0" y="0"/>
+          <a:ext cx="0" cy="0"/>
+          <a:chOff x="0" y="0"/>
+          <a:chExt cx="0" cy="0"/>
+        </a:xfrm>
+      </p:grpSpPr>
+      <p:sp>
+        <p:nvSpPr>
+          <p:cNvPr id="10" name="矩形 9">
+            <a:extLst>
+              <a:ext uri="{FF2B5EF4-FFF2-40B4-BE49-F238E27FC236}">
+                <a16:creationId xmlns:a16="http://schemas.microsoft.com/office/drawing/2014/main" id="{A5818015-5ED7-4981-A271-668BCB6BF0B0}"/>
+              </a:ext>
+            </a:extLst>
+          </p:cNvPr>
+          <p:cNvSpPr/>
+          <p:nvPr/>
+        </p:nvSpPr>
+        <p:spPr>
+          <a:xfrm>
+            <a:off x="0" y="0"/>
+            <a:ext cx="2441359" cy="6858000"/>
+          </a:xfrm>
+          <a:prstGeom prst="rect">
+            <a:avLst/>
+          </a:prstGeom>
+          <a:solidFill>
+            <a:srgbClr val="0E0C13"/>
+          </a:solidFill>
+          <a:ln>
+            <a:noFill/>
+          </a:ln>
+        </p:spPr>
+        <p:style>
+          <a:lnRef idx="2">
+            <a:schemeClr val="accent1">
+              <a:shade val="50000"/>
+            </a:schemeClr>
+          </a:lnRef>
+          <a:fillRef idx="1">
+            <a:schemeClr val="accent1"/>
+          </a:fillRef>
+          <a:effectRef idx="0">
+            <a:schemeClr val="accent1"/>
+          </a:effectRef>
+          <a:fontRef idx="minor">
+            <a:schemeClr val="lt1"/>
+          </a:fontRef>
+        </p:style>
+        <p:txBody>
+          <a:bodyPr rtlCol="0" anchor="ctr"/>
+          <a:lstStyle/>
+          <a:p>
+            <a:pPr marL="0" marR="0" lvl="0" indent="0" algn="ctr" defTabSz="914400" rtl="0" eaLnBrk="1" fontAlgn="auto" latinLnBrk="0" hangingPunct="1">
+              <a:lnSpc>
+                <a:spcPct val="100000"/>
+              </a:lnSpc>
+              <a:spcBef>
+                <a:spcPts val="0"/>
+              </a:spcBef>
+              <a:spcAft>
+                <a:spcPts val="0"/>
+              </a:spcAft>
+              <a:buClrTx/>
+              <a:buSzTx/>
+              <a:buFontTx/>
+              <a:buNone/>
+              <a:tabLst/>
+              <a:defRPr/>
+            </a:pPr>
+            <a:endParaRPr kumimoji="0" lang="en-US" sz="1800" b="0" i="0" u="none" strike="noStrike" kern="1200" cap="none" spc="0" normalizeH="0" baseline="0" noProof="0" dirty="0">
+              <a:ln>
+                <a:noFill/>
+              </a:ln>
+              <a:solidFill>
+                <a:prstClr val="white"/>
+              </a:solidFill>
+              <a:effectLst/>
+              <a:uLnTx/>
+              <a:uFillTx/>
+              <a:latin typeface="Calibri" panose="020F0502020204030204"/>
+              <a:ea typeface="+mn-ea"/>
+              <a:cs typeface="+mn-cs"/>
+            </a:endParaRPr>
+          </a:p>
+        </p:txBody>
+      </p:sp>
+      <p:sp>
+        <p:nvSpPr>
+          <p:cNvPr id="11" name="文本框 10">
+            <a:extLst>
+              <a:ext uri="{FF2B5EF4-FFF2-40B4-BE49-F238E27FC236}">
+                <a16:creationId xmlns:a16="http://schemas.microsoft.com/office/drawing/2014/main" id="{67E1321D-BD42-455D-A6E9-7D926506191E}"/>
+              </a:ext>
+            </a:extLst>
+          </p:cNvPr>
+          <p:cNvSpPr txBox="1"/>
+          <p:nvPr/>
+        </p:nvSpPr>
+        <p:spPr>
+          <a:xfrm>
+            <a:off x="345731" y="1580251"/>
+            <a:ext cx="963725" cy="1015663"/>
+          </a:xfrm>
+          <a:prstGeom prst="rect">
+            <a:avLst/>
+          </a:prstGeom>
+          <a:noFill/>
+        </p:spPr>
+        <p:txBody>
+          <a:bodyPr wrap="none" rtlCol="0">
+            <a:spAutoFit/>
+          </a:bodyPr>
+          <a:lstStyle/>
+          <a:p>
+            <a:pPr marL="0" marR="0" lvl="0" indent="0" algn="l" defTabSz="914400" rtl="0" eaLnBrk="1" fontAlgn="auto" latinLnBrk="0" hangingPunct="1">
+              <a:lnSpc>
+                <a:spcPct val="100000"/>
+              </a:lnSpc>
+              <a:spcBef>
+                <a:spcPts val="0"/>
+              </a:spcBef>
+              <a:spcAft>
+                <a:spcPts val="0"/>
+              </a:spcAft>
+              <a:buClrTx/>
+              <a:buSzTx/>
+              <a:buFontTx/>
+              <a:buNone/>
+              <a:tabLst/>
+              <a:defRPr/>
+            </a:pPr>
+            <a:r>
+              <a:rPr kumimoji="0" lang="en-US" sz="6000" b="0" i="0" u="none" strike="noStrike" kern="1200" cap="none" spc="0" normalizeH="0" baseline="0" noProof="0" dirty="0">
+                <a:ln>
+                  <a:noFill/>
+                </a:ln>
+                <a:solidFill>
+                  <a:srgbClr val="24F9CB"/>
+                </a:solidFill>
+                <a:effectLst/>
+                <a:uLnTx/>
+                <a:uFillTx/>
+                <a:latin typeface="Calibri" panose="020F0502020204030204"/>
+                <a:ea typeface="+mn-ea"/>
+                <a:cs typeface="+mn-cs"/>
+              </a:rPr>
+              <a:t>00</a:t>
+            </a:r>
+          </a:p>
+        </p:txBody>
+      </p:sp>
+      <p:sp>
+        <p:nvSpPr>
+          <p:cNvPr id="12" name="文本框 11">
+            <a:extLst>
+              <a:ext uri="{FF2B5EF4-FFF2-40B4-BE49-F238E27FC236}">
+                <a16:creationId xmlns:a16="http://schemas.microsoft.com/office/drawing/2014/main" id="{548CB999-F3EE-4A2C-AFA2-381782F1CCA1}"/>
+              </a:ext>
+            </a:extLst>
+          </p:cNvPr>
+          <p:cNvSpPr txBox="1"/>
+          <p:nvPr/>
+        </p:nvSpPr>
+        <p:spPr>
+          <a:xfrm>
+            <a:off x="345731" y="2595914"/>
+            <a:ext cx="1776032" cy="830997"/>
+          </a:xfrm>
+          <a:prstGeom prst="rect">
+            <a:avLst/>
+          </a:prstGeom>
+          <a:noFill/>
+        </p:spPr>
+        <p:txBody>
+          <a:bodyPr wrap="square" rtlCol="0">
+            <a:spAutoFit/>
+          </a:bodyPr>
+          <a:lstStyle/>
+          <a:p>
+            <a:pPr marL="0" marR="0" lvl="0" indent="0" algn="l" defTabSz="914400" rtl="0" eaLnBrk="1" fontAlgn="auto" latinLnBrk="0" hangingPunct="1">
+              <a:lnSpc>
+                <a:spcPct val="100000"/>
+              </a:lnSpc>
+              <a:spcBef>
+                <a:spcPts val="0"/>
+              </a:spcBef>
+              <a:spcAft>
+                <a:spcPts val="0"/>
+              </a:spcAft>
+              <a:buClrTx/>
+              <a:buSzTx/>
+              <a:buFontTx/>
+              <a:buNone/>
+              <a:tabLst/>
+              <a:defRPr/>
+            </a:pPr>
+            <a:r>
+              <a:rPr kumimoji="0" lang="en-US" altLang="zh-CN" sz="2400" b="0" i="0" u="none" strike="noStrike" kern="1200" cap="none" spc="0" normalizeH="0" baseline="0" noProof="0" dirty="0">
+                <a:ln>
+                  <a:noFill/>
+                </a:ln>
+                <a:solidFill>
+                  <a:prstClr val="white"/>
+                </a:solidFill>
+                <a:effectLst/>
+                <a:uLnTx/>
+                <a:uFillTx/>
+                <a:latin typeface="Calibri" panose="020F0502020204030204"/>
+                <a:ea typeface="等线" panose="02010600030101010101" pitchFamily="2" charset="-122"/>
+                <a:cs typeface="+mn-cs"/>
+              </a:rPr>
+              <a:t>Wrap the Component</a:t>
+            </a:r>
+          </a:p>
+        </p:txBody>
+      </p:sp>
+      <p:pic>
+        <p:nvPicPr>
+          <p:cNvPr id="8" name="图形 7">
+            <a:extLst>
+              <a:ext uri="{FF2B5EF4-FFF2-40B4-BE49-F238E27FC236}">
+                <a16:creationId xmlns:a16="http://schemas.microsoft.com/office/drawing/2014/main" id="{AFA1FBE0-585E-4A7A-8D54-08D1C4C22B49}"/>
+              </a:ext>
+            </a:extLst>
+          </p:cNvPr>
+          <p:cNvPicPr>
+            <a:picLocks noChangeAspect="1"/>
+          </p:cNvPicPr>
+          <p:nvPr/>
+        </p:nvPicPr>
+        <p:blipFill>
+          <a:blip r:embed="rId2">
+            <a:extLst>
+              <a:ext uri="{96DAC541-7B7A-43D3-8B79-37D633B846F1}">
+                <asvg:svgBlip xmlns:asvg="http://schemas.microsoft.com/office/drawing/2016/SVG/main" r:embed="rId3"/>
+              </a:ext>
+            </a:extLst>
+          </a:blip>
+          <a:stretch>
+            <a:fillRect/>
+          </a:stretch>
+        </p:blipFill>
+        <p:spPr>
+          <a:xfrm>
+            <a:off x="214225" y="6493296"/>
+            <a:ext cx="1514139" cy="182880"/>
+          </a:xfrm>
+          <a:prstGeom prst="rect">
+            <a:avLst/>
+          </a:prstGeom>
+        </p:spPr>
+      </p:pic>
       <p:sp>
         <p:nvSpPr>
           <p:cNvPr id="15" name="矩形 14">
@@ -8921,6 +9396,641 @@
         <p:spPr>
           <a:xfrm rot="10800000">
             <a:off x="2787090" y="4909448"/>
+            <a:ext cx="45719" cy="457200"/>
+          </a:xfrm>
+          <a:prstGeom prst="rect">
+            <a:avLst/>
+          </a:prstGeom>
+          <a:solidFill>
+            <a:srgbClr val="FFA400"/>
+          </a:solidFill>
+          <a:ln>
+            <a:noFill/>
+          </a:ln>
+        </p:spPr>
+        <p:style>
+          <a:lnRef idx="2">
+            <a:schemeClr val="accent1">
+              <a:shade val="50000"/>
+            </a:schemeClr>
+          </a:lnRef>
+          <a:fillRef idx="1">
+            <a:schemeClr val="accent1"/>
+          </a:fillRef>
+          <a:effectRef idx="0">
+            <a:schemeClr val="accent1"/>
+          </a:effectRef>
+          <a:fontRef idx="minor">
+            <a:schemeClr val="lt1"/>
+          </a:fontRef>
+        </p:style>
+        <p:txBody>
+          <a:bodyPr rtlCol="0" anchor="ctr"/>
+          <a:lstStyle/>
+          <a:p>
+            <a:pPr marL="0" marR="0" lvl="0" indent="0" algn="ctr" defTabSz="914400" rtl="0" eaLnBrk="1" fontAlgn="auto" latinLnBrk="0" hangingPunct="1">
+              <a:lnSpc>
+                <a:spcPct val="100000"/>
+              </a:lnSpc>
+              <a:spcBef>
+                <a:spcPts val="0"/>
+              </a:spcBef>
+              <a:spcAft>
+                <a:spcPts val="0"/>
+              </a:spcAft>
+              <a:buClrTx/>
+              <a:buSzTx/>
+              <a:buFontTx/>
+              <a:buNone/>
+              <a:tabLst/>
+              <a:defRPr/>
+            </a:pPr>
+            <a:endParaRPr kumimoji="0" lang="en-US" sz="1800" b="0" i="0" u="none" strike="noStrike" kern="1200" cap="none" spc="0" normalizeH="0" baseline="0" noProof="0">
+              <a:ln>
+                <a:noFill/>
+              </a:ln>
+              <a:solidFill>
+                <a:prstClr val="white"/>
+              </a:solidFill>
+              <a:effectLst/>
+              <a:uLnTx/>
+              <a:uFillTx/>
+              <a:latin typeface="Calibri" panose="020F0502020204030204"/>
+              <a:ea typeface="+mn-ea"/>
+              <a:cs typeface="+mn-cs"/>
+            </a:endParaRPr>
+          </a:p>
+        </p:txBody>
+      </p:sp>
+      <p:sp>
+        <p:nvSpPr>
+          <p:cNvPr id="4" name="矩形 3">
+            <a:extLst>
+              <a:ext uri="{FF2B5EF4-FFF2-40B4-BE49-F238E27FC236}">
+                <a16:creationId xmlns:a16="http://schemas.microsoft.com/office/drawing/2014/main" id="{4DA23149-21BA-4B0F-A5EF-F944BD32FB8F}"/>
+              </a:ext>
+            </a:extLst>
+          </p:cNvPr>
+          <p:cNvSpPr/>
+          <p:nvPr/>
+        </p:nvSpPr>
+        <p:spPr>
+          <a:xfrm>
+            <a:off x="2787088" y="1390274"/>
+            <a:ext cx="7662036" cy="1815882"/>
+          </a:xfrm>
+          <a:prstGeom prst="rect">
+            <a:avLst/>
+          </a:prstGeom>
+        </p:spPr>
+        <p:txBody>
+          <a:bodyPr wrap="square">
+            <a:spAutoFit/>
+          </a:bodyPr>
+          <a:lstStyle/>
+          <a:p>
+            <a:r>
+              <a:rPr lang="en-US" sz="1600" dirty="0">
+                <a:solidFill>
+                  <a:srgbClr val="569CD6"/>
+                </a:solidFill>
+                <a:latin typeface="Consolas" panose="020B0609020204030204" pitchFamily="49" charset="0"/>
+              </a:rPr>
+              <a:t>const</a:t>
+            </a:r>
+            <a:r>
+              <a:rPr lang="en-US" sz="1600" dirty="0">
+                <a:solidFill>
+                  <a:srgbClr val="D4D4D4"/>
+                </a:solidFill>
+                <a:latin typeface="Consolas" panose="020B0609020204030204" pitchFamily="49" charset="0"/>
+              </a:rPr>
+              <a:t> </a:t>
+            </a:r>
+            <a:r>
+              <a:rPr lang="en-US" sz="1600" dirty="0" err="1">
+                <a:solidFill>
+                  <a:srgbClr val="DCDCAA"/>
+                </a:solidFill>
+                <a:latin typeface="Consolas" panose="020B0609020204030204" pitchFamily="49" charset="0"/>
+              </a:rPr>
+              <a:t>mapState</a:t>
+            </a:r>
+            <a:r>
+              <a:rPr lang="en-US" sz="1600" dirty="0">
+                <a:solidFill>
+                  <a:srgbClr val="D4D4D4"/>
+                </a:solidFill>
+                <a:latin typeface="Consolas" panose="020B0609020204030204" pitchFamily="49" charset="0"/>
+              </a:rPr>
+              <a:t> = </a:t>
+            </a:r>
+            <a:r>
+              <a:rPr lang="en-US" sz="1600" dirty="0">
+                <a:solidFill>
+                  <a:srgbClr val="9CDCFE"/>
+                </a:solidFill>
+                <a:latin typeface="Consolas" panose="020B0609020204030204" pitchFamily="49" charset="0"/>
+              </a:rPr>
+              <a:t>state</a:t>
+            </a:r>
+            <a:r>
+              <a:rPr lang="en-US" sz="1600" dirty="0">
+                <a:solidFill>
+                  <a:srgbClr val="D4D4D4"/>
+                </a:solidFill>
+                <a:latin typeface="Consolas" panose="020B0609020204030204" pitchFamily="49" charset="0"/>
+              </a:rPr>
+              <a:t> </a:t>
+            </a:r>
+            <a:r>
+              <a:rPr lang="en-US" sz="1600" dirty="0">
+                <a:solidFill>
+                  <a:srgbClr val="569CD6"/>
+                </a:solidFill>
+                <a:latin typeface="Consolas" panose="020B0609020204030204" pitchFamily="49" charset="0"/>
+              </a:rPr>
+              <a:t>=&gt;</a:t>
+            </a:r>
+            <a:r>
+              <a:rPr lang="en-US" sz="1600" dirty="0">
+                <a:solidFill>
+                  <a:srgbClr val="D4D4D4"/>
+                </a:solidFill>
+                <a:latin typeface="Consolas" panose="020B0609020204030204" pitchFamily="49" charset="0"/>
+              </a:rPr>
+              <a:t> ({</a:t>
+            </a:r>
+          </a:p>
+          <a:p>
+            <a:r>
+              <a:rPr lang="en-US" sz="1600" dirty="0">
+                <a:solidFill>
+                  <a:srgbClr val="9CDCFE"/>
+                </a:solidFill>
+                <a:latin typeface="Consolas" panose="020B0609020204030204" pitchFamily="49" charset="0"/>
+              </a:rPr>
+              <a:t>  questions:</a:t>
+            </a:r>
+            <a:r>
+              <a:rPr lang="en-US" sz="1600" dirty="0">
+                <a:solidFill>
+                  <a:srgbClr val="D4D4D4"/>
+                </a:solidFill>
+                <a:latin typeface="Consolas" panose="020B0609020204030204" pitchFamily="49" charset="0"/>
+              </a:rPr>
+              <a:t> </a:t>
+            </a:r>
+            <a:r>
+              <a:rPr lang="en-US" sz="1600" dirty="0" err="1">
+                <a:solidFill>
+                  <a:srgbClr val="9CDCFE"/>
+                </a:solidFill>
+                <a:latin typeface="Consolas" panose="020B0609020204030204" pitchFamily="49" charset="0"/>
+              </a:rPr>
+              <a:t>state</a:t>
+            </a:r>
+            <a:r>
+              <a:rPr lang="en-US" sz="1600" dirty="0" err="1">
+                <a:solidFill>
+                  <a:srgbClr val="D4D4D4"/>
+                </a:solidFill>
+                <a:latin typeface="Consolas" panose="020B0609020204030204" pitchFamily="49" charset="0"/>
+              </a:rPr>
+              <a:t>.</a:t>
+            </a:r>
+            <a:r>
+              <a:rPr lang="en-US" sz="1600" dirty="0" err="1">
+                <a:solidFill>
+                  <a:srgbClr val="9CDCFE"/>
+                </a:solidFill>
+                <a:latin typeface="Consolas" panose="020B0609020204030204" pitchFamily="49" charset="0"/>
+              </a:rPr>
+              <a:t>questions</a:t>
+            </a:r>
+            <a:r>
+              <a:rPr lang="en-US" sz="1600" dirty="0">
+                <a:solidFill>
+                  <a:srgbClr val="D4D4D4"/>
+                </a:solidFill>
+                <a:latin typeface="Consolas" panose="020B0609020204030204" pitchFamily="49" charset="0"/>
+              </a:rPr>
+              <a:t>,</a:t>
+            </a:r>
+          </a:p>
+          <a:p>
+            <a:r>
+              <a:rPr lang="en-US" sz="1600" dirty="0">
+                <a:solidFill>
+                  <a:srgbClr val="D4D4D4"/>
+                </a:solidFill>
+                <a:latin typeface="Consolas" panose="020B0609020204030204" pitchFamily="49" charset="0"/>
+              </a:rPr>
+              <a:t>});</a:t>
+            </a:r>
+          </a:p>
+          <a:p>
+            <a:r>
+              <a:rPr lang="en-US" sz="1600" dirty="0">
+                <a:solidFill>
+                  <a:srgbClr val="569CD6"/>
+                </a:solidFill>
+                <a:latin typeface="Consolas" panose="020B0609020204030204" pitchFamily="49" charset="0"/>
+              </a:rPr>
+              <a:t>const</a:t>
+            </a:r>
+            <a:r>
+              <a:rPr lang="en-US" sz="1600" dirty="0">
+                <a:solidFill>
+                  <a:srgbClr val="D4D4D4"/>
+                </a:solidFill>
+                <a:latin typeface="Consolas" panose="020B0609020204030204" pitchFamily="49" charset="0"/>
+              </a:rPr>
+              <a:t> </a:t>
+            </a:r>
+            <a:r>
+              <a:rPr lang="en-US" sz="1600" dirty="0" err="1">
+                <a:solidFill>
+                  <a:srgbClr val="DCDCAA"/>
+                </a:solidFill>
+                <a:latin typeface="Consolas" panose="020B0609020204030204" pitchFamily="49" charset="0"/>
+              </a:rPr>
+              <a:t>mapDispatch</a:t>
+            </a:r>
+            <a:r>
+              <a:rPr lang="en-US" sz="1600" dirty="0">
+                <a:solidFill>
+                  <a:srgbClr val="D4D4D4"/>
+                </a:solidFill>
+                <a:latin typeface="Consolas" panose="020B0609020204030204" pitchFamily="49" charset="0"/>
+              </a:rPr>
+              <a:t> = ({ </a:t>
+            </a:r>
+            <a:r>
+              <a:rPr lang="en-US" sz="1600" dirty="0">
+                <a:solidFill>
+                  <a:srgbClr val="9CDCFE"/>
+                </a:solidFill>
+                <a:latin typeface="Consolas" panose="020B0609020204030204" pitchFamily="49" charset="0"/>
+              </a:rPr>
+              <a:t>questions</a:t>
+            </a:r>
+            <a:r>
+              <a:rPr lang="en-US" sz="1600" dirty="0">
+                <a:solidFill>
+                  <a:srgbClr val="D4D4D4"/>
+                </a:solidFill>
+                <a:latin typeface="Consolas" panose="020B0609020204030204" pitchFamily="49" charset="0"/>
+              </a:rPr>
+              <a:t>: { </a:t>
+            </a:r>
+            <a:r>
+              <a:rPr lang="en-US" sz="1600" dirty="0" err="1">
+                <a:solidFill>
+                  <a:srgbClr val="9CDCFE"/>
+                </a:solidFill>
+                <a:latin typeface="Consolas" panose="020B0609020204030204" pitchFamily="49" charset="0"/>
+              </a:rPr>
+              <a:t>getAll</a:t>
+            </a:r>
+            <a:r>
+              <a:rPr lang="en-US" sz="1600" dirty="0">
+                <a:solidFill>
+                  <a:srgbClr val="D4D4D4"/>
+                </a:solidFill>
+                <a:latin typeface="Consolas" panose="020B0609020204030204" pitchFamily="49" charset="0"/>
+              </a:rPr>
+              <a:t> } }) </a:t>
+            </a:r>
+            <a:r>
+              <a:rPr lang="en-US" sz="1600" dirty="0">
+                <a:solidFill>
+                  <a:srgbClr val="569CD6"/>
+                </a:solidFill>
+                <a:latin typeface="Consolas" panose="020B0609020204030204" pitchFamily="49" charset="0"/>
+              </a:rPr>
+              <a:t>=&gt;</a:t>
+            </a:r>
+            <a:r>
+              <a:rPr lang="en-US" sz="1600" dirty="0">
+                <a:solidFill>
+                  <a:srgbClr val="D4D4D4"/>
+                </a:solidFill>
+                <a:latin typeface="Consolas" panose="020B0609020204030204" pitchFamily="49" charset="0"/>
+              </a:rPr>
+              <a:t> ({</a:t>
+            </a:r>
+          </a:p>
+          <a:p>
+            <a:r>
+              <a:rPr lang="en-US" sz="1600" dirty="0">
+                <a:solidFill>
+                  <a:srgbClr val="DCDCAA"/>
+                </a:solidFill>
+                <a:latin typeface="Consolas" panose="020B0609020204030204" pitchFamily="49" charset="0"/>
+              </a:rPr>
+              <a:t>  </a:t>
+            </a:r>
+            <a:r>
+              <a:rPr lang="en-US" sz="1600" dirty="0" err="1">
+                <a:solidFill>
+                  <a:srgbClr val="DCDCAA"/>
+                </a:solidFill>
+                <a:latin typeface="Consolas" panose="020B0609020204030204" pitchFamily="49" charset="0"/>
+              </a:rPr>
+              <a:t>getAll</a:t>
+            </a:r>
+            <a:r>
+              <a:rPr lang="en-US" sz="1600" dirty="0">
+                <a:solidFill>
+                  <a:srgbClr val="9CDCFE"/>
+                </a:solidFill>
+                <a:latin typeface="Consolas" panose="020B0609020204030204" pitchFamily="49" charset="0"/>
+              </a:rPr>
+              <a:t>:</a:t>
+            </a:r>
+            <a:r>
+              <a:rPr lang="en-US" sz="1600" dirty="0">
+                <a:solidFill>
+                  <a:srgbClr val="D4D4D4"/>
+                </a:solidFill>
+                <a:latin typeface="Consolas" panose="020B0609020204030204" pitchFamily="49" charset="0"/>
+              </a:rPr>
+              <a:t> () </a:t>
+            </a:r>
+            <a:r>
+              <a:rPr lang="en-US" sz="1600" dirty="0">
+                <a:solidFill>
+                  <a:srgbClr val="569CD6"/>
+                </a:solidFill>
+                <a:latin typeface="Consolas" panose="020B0609020204030204" pitchFamily="49" charset="0"/>
+              </a:rPr>
+              <a:t>=&gt;</a:t>
+            </a:r>
+            <a:r>
+              <a:rPr lang="en-US" sz="1600" dirty="0">
+                <a:solidFill>
+                  <a:srgbClr val="D4D4D4"/>
+                </a:solidFill>
+                <a:latin typeface="Consolas" panose="020B0609020204030204" pitchFamily="49" charset="0"/>
+              </a:rPr>
+              <a:t> </a:t>
+            </a:r>
+            <a:r>
+              <a:rPr lang="en-US" sz="1600" dirty="0" err="1">
+                <a:solidFill>
+                  <a:srgbClr val="DCDCAA"/>
+                </a:solidFill>
+                <a:latin typeface="Consolas" panose="020B0609020204030204" pitchFamily="49" charset="0"/>
+              </a:rPr>
+              <a:t>getAll</a:t>
+            </a:r>
+            <a:r>
+              <a:rPr lang="en-US" sz="1600" dirty="0">
+                <a:solidFill>
+                  <a:srgbClr val="D4D4D4"/>
+                </a:solidFill>
+                <a:latin typeface="Consolas" panose="020B0609020204030204" pitchFamily="49" charset="0"/>
+              </a:rPr>
+              <a:t>(),</a:t>
+            </a:r>
+          </a:p>
+          <a:p>
+            <a:r>
+              <a:rPr lang="en-US" sz="1600" dirty="0">
+                <a:solidFill>
+                  <a:srgbClr val="D4D4D4"/>
+                </a:solidFill>
+                <a:latin typeface="Consolas" panose="020B0609020204030204" pitchFamily="49" charset="0"/>
+              </a:rPr>
+              <a:t>});</a:t>
+            </a:r>
+          </a:p>
+          <a:p>
+            <a:r>
+              <a:rPr lang="en-US" sz="1600" dirty="0">
+                <a:solidFill>
+                  <a:srgbClr val="C586C0"/>
+                </a:solidFill>
+                <a:latin typeface="Consolas" panose="020B0609020204030204" pitchFamily="49" charset="0"/>
+              </a:rPr>
+              <a:t>export</a:t>
+            </a:r>
+            <a:r>
+              <a:rPr lang="en-US" sz="1600" dirty="0">
+                <a:solidFill>
+                  <a:srgbClr val="D4D4D4"/>
+                </a:solidFill>
+                <a:latin typeface="Consolas" panose="020B0609020204030204" pitchFamily="49" charset="0"/>
+              </a:rPr>
+              <a:t> </a:t>
+            </a:r>
+            <a:r>
+              <a:rPr lang="en-US" sz="1600" dirty="0">
+                <a:solidFill>
+                  <a:srgbClr val="C586C0"/>
+                </a:solidFill>
+                <a:latin typeface="Consolas" panose="020B0609020204030204" pitchFamily="49" charset="0"/>
+              </a:rPr>
+              <a:t>default</a:t>
+            </a:r>
+            <a:r>
+              <a:rPr lang="en-US" sz="1600" dirty="0">
+                <a:solidFill>
+                  <a:srgbClr val="D4D4D4"/>
+                </a:solidFill>
+                <a:latin typeface="Consolas" panose="020B0609020204030204" pitchFamily="49" charset="0"/>
+              </a:rPr>
+              <a:t> </a:t>
+            </a:r>
+            <a:r>
+              <a:rPr lang="en-US" sz="1600" dirty="0">
+                <a:solidFill>
+                  <a:srgbClr val="DCDCAA"/>
+                </a:solidFill>
+                <a:latin typeface="Consolas" panose="020B0609020204030204" pitchFamily="49" charset="0"/>
+              </a:rPr>
+              <a:t>connect</a:t>
+            </a:r>
+            <a:r>
+              <a:rPr lang="en-US" sz="1600" dirty="0">
+                <a:solidFill>
+                  <a:srgbClr val="D4D4D4"/>
+                </a:solidFill>
+                <a:latin typeface="Consolas" panose="020B0609020204030204" pitchFamily="49" charset="0"/>
+              </a:rPr>
+              <a:t>(</a:t>
+            </a:r>
+            <a:r>
+              <a:rPr lang="en-US" sz="1600" dirty="0" err="1">
+                <a:solidFill>
+                  <a:srgbClr val="9CDCFE"/>
+                </a:solidFill>
+                <a:latin typeface="Consolas" panose="020B0609020204030204" pitchFamily="49" charset="0"/>
+              </a:rPr>
+              <a:t>mapState</a:t>
+            </a:r>
+            <a:r>
+              <a:rPr lang="en-US" sz="1600" dirty="0">
+                <a:solidFill>
+                  <a:srgbClr val="D4D4D4"/>
+                </a:solidFill>
+                <a:latin typeface="Consolas" panose="020B0609020204030204" pitchFamily="49" charset="0"/>
+              </a:rPr>
+              <a:t>, </a:t>
+            </a:r>
+            <a:r>
+              <a:rPr lang="en-US" sz="1600" dirty="0" err="1">
+                <a:solidFill>
+                  <a:srgbClr val="9CDCFE"/>
+                </a:solidFill>
+                <a:latin typeface="Consolas" panose="020B0609020204030204" pitchFamily="49" charset="0"/>
+              </a:rPr>
+              <a:t>mapDispatch</a:t>
+            </a:r>
+            <a:r>
+              <a:rPr lang="en-US" sz="1600" dirty="0">
+                <a:solidFill>
+                  <a:srgbClr val="D4D4D4"/>
+                </a:solidFill>
+                <a:latin typeface="Consolas" panose="020B0609020204030204" pitchFamily="49" charset="0"/>
+              </a:rPr>
+              <a:t>)(</a:t>
+            </a:r>
+            <a:r>
+              <a:rPr lang="en-US" sz="1600" dirty="0">
+                <a:solidFill>
+                  <a:srgbClr val="9CDCFE"/>
+                </a:solidFill>
+                <a:latin typeface="Consolas" panose="020B0609020204030204" pitchFamily="49" charset="0"/>
+              </a:rPr>
+              <a:t>Questions</a:t>
+            </a:r>
+            <a:r>
+              <a:rPr lang="en-US" sz="1600" dirty="0">
+                <a:solidFill>
+                  <a:srgbClr val="D4D4D4"/>
+                </a:solidFill>
+                <a:latin typeface="Consolas" panose="020B0609020204030204" pitchFamily="49" charset="0"/>
+              </a:rPr>
+              <a:t>);</a:t>
+            </a:r>
+            <a:endParaRPr lang="en-US" sz="1600" b="0" dirty="0">
+              <a:solidFill>
+                <a:srgbClr val="D4D4D4"/>
+              </a:solidFill>
+              <a:effectLst/>
+              <a:latin typeface="Consolas" panose="020B0609020204030204" pitchFamily="49" charset="0"/>
+            </a:endParaRPr>
+          </a:p>
+        </p:txBody>
+      </p:sp>
+      <p:sp>
+        <p:nvSpPr>
+          <p:cNvPr id="29" name="矩形 28">
+            <a:extLst>
+              <a:ext uri="{FF2B5EF4-FFF2-40B4-BE49-F238E27FC236}">
+                <a16:creationId xmlns:a16="http://schemas.microsoft.com/office/drawing/2014/main" id="{77558470-0D55-4E58-9C04-971B1F088077}"/>
+              </a:ext>
+            </a:extLst>
+          </p:cNvPr>
+          <p:cNvSpPr/>
+          <p:nvPr/>
+        </p:nvSpPr>
+        <p:spPr>
+          <a:xfrm>
+            <a:off x="2832809" y="5517094"/>
+            <a:ext cx="9289851" cy="369332"/>
+          </a:xfrm>
+          <a:prstGeom prst="rect">
+            <a:avLst/>
+          </a:prstGeom>
+        </p:spPr>
+        <p:txBody>
+          <a:bodyPr wrap="none">
+            <a:spAutoFit/>
+          </a:bodyPr>
+          <a:lstStyle/>
+          <a:p>
+            <a:r>
+              <a:rPr lang="zh-CN" altLang="en-US" dirty="0">
+                <a:solidFill>
+                  <a:schemeClr val="bg1"/>
+                </a:solidFill>
+              </a:rPr>
+              <a:t>如果不需要</a:t>
+            </a:r>
+            <a:r>
+              <a:rPr lang="en-US" altLang="zh-CN" dirty="0" err="1">
+                <a:solidFill>
+                  <a:schemeClr val="bg1"/>
+                </a:solidFill>
+              </a:rPr>
+              <a:t>mapState</a:t>
+            </a:r>
+            <a:r>
+              <a:rPr lang="zh-CN" altLang="en-US" dirty="0">
+                <a:solidFill>
+                  <a:schemeClr val="bg1"/>
+                </a:solidFill>
+              </a:rPr>
+              <a:t>或者</a:t>
+            </a:r>
+            <a:r>
+              <a:rPr lang="en-US" altLang="zh-CN" dirty="0" err="1">
+                <a:solidFill>
+                  <a:schemeClr val="bg1"/>
+                </a:solidFill>
+              </a:rPr>
+              <a:t>mapDispatch</a:t>
+            </a:r>
+            <a:r>
+              <a:rPr lang="zh-CN" altLang="en-US" dirty="0">
+                <a:solidFill>
+                  <a:schemeClr val="bg1"/>
+                </a:solidFill>
+              </a:rPr>
+              <a:t>，那么在</a:t>
+            </a:r>
+            <a:r>
+              <a:rPr lang="en-US" altLang="zh-CN" dirty="0">
+                <a:solidFill>
+                  <a:schemeClr val="bg1"/>
+                </a:solidFill>
+              </a:rPr>
+              <a:t>connect</a:t>
+            </a:r>
+            <a:r>
+              <a:rPr lang="zh-CN" altLang="en-US" dirty="0">
+                <a:solidFill>
+                  <a:schemeClr val="bg1"/>
+                </a:solidFill>
+              </a:rPr>
+              <a:t>函数中，可以给相应的参数设置为空</a:t>
+            </a:r>
+            <a:endParaRPr lang="en-US" dirty="0">
+              <a:solidFill>
+                <a:schemeClr val="bg1"/>
+              </a:solidFill>
+            </a:endParaRPr>
+          </a:p>
+        </p:txBody>
+      </p:sp>
+      <p:sp>
+        <p:nvSpPr>
+          <p:cNvPr id="30" name="Rectangle 3">
+            <a:extLst>
+              <a:ext uri="{FF2B5EF4-FFF2-40B4-BE49-F238E27FC236}">
+                <a16:creationId xmlns:a16="http://schemas.microsoft.com/office/drawing/2014/main" id="{89F41A80-B4E2-43E1-8D95-38A59C587081}"/>
+              </a:ext>
+            </a:extLst>
+          </p:cNvPr>
+          <p:cNvSpPr/>
+          <p:nvPr/>
+        </p:nvSpPr>
+        <p:spPr>
+          <a:xfrm rot="10800000">
+            <a:off x="2787090" y="5473160"/>
             <a:ext cx="45719" cy="457200"/>
           </a:xfrm>
           <a:prstGeom prst="rect">

</xml_diff>